<commit_message>
new amazing effects added to powerpoint.
</commit_message>
<xml_diff>
--- a/Decorator Pattern.pptx
+++ b/Decorator Pattern.pptx
@@ -112,6 +112,11 @@
       </a:defRPr>
     </a:lvl9pPr>
   </p:defaultTextStyle>
+  <p:extLst>
+    <p:ext uri="{EFAFB233-063F-42B5-8137-9DF3F51BA10A}">
+      <p15:sldGuideLst xmlns:p15="http://schemas.microsoft.com/office/powerpoint/2012/main"/>
+    </p:ext>
+  </p:extLst>
 </p:presentation>
 </file>
 
@@ -8908,7 +8913,7 @@
           <a:p>
             <a:fld id="{6AD6EE87-EBD5-4F12-A48A-63ACA297AC8F}" type="datetimeFigureOut">
               <a:rPr lang="en-US" dirty="0"/>
-              <a:t>5/9/2017</a:t>
+              <a:t>5/10/2017</a:t>
             </a:fld>
             <a:endParaRPr lang="en-US" dirty="0"/>
           </a:p>
@@ -8950,7 +8955,7 @@
           <a:p>
             <a:fld id="{4FAB73BC-B049-4115-A692-8D63A059BFB8}" type="slidenum">
               <a:rPr lang="en-US" dirty="0"/>
-              <a:t>‹nr.›</a:t>
+              <a:t>‹#›</a:t>
             </a:fld>
             <a:endParaRPr lang="en-US" dirty="0"/>
           </a:p>
@@ -9110,7 +9115,7 @@
           <a:p>
             <a:fld id="{4CD73815-2707-4475-8F1A-B873CB631BB4}" type="datetimeFigureOut">
               <a:rPr lang="en-US" dirty="0"/>
-              <a:t>5/9/2017</a:t>
+              <a:t>5/10/2017</a:t>
             </a:fld>
             <a:endParaRPr lang="en-US" dirty="0"/>
           </a:p>
@@ -9152,7 +9157,7 @@
           <a:p>
             <a:fld id="{4FAB73BC-B049-4115-A692-8D63A059BFB8}" type="slidenum">
               <a:rPr lang="en-US" dirty="0"/>
-              <a:t>‹nr.›</a:t>
+              <a:t>‹#›</a:t>
             </a:fld>
             <a:endParaRPr lang="en-US" dirty="0"/>
           </a:p>
@@ -9285,7 +9290,7 @@
           <a:p>
             <a:fld id="{2A4AFB99-0EAB-4182-AFF8-E214C82A68F6}" type="datetimeFigureOut">
               <a:rPr lang="en-US" dirty="0"/>
-              <a:t>5/9/2017</a:t>
+              <a:t>5/10/2017</a:t>
             </a:fld>
             <a:endParaRPr lang="en-US" dirty="0"/>
           </a:p>
@@ -9327,7 +9332,7 @@
           <a:p>
             <a:fld id="{4FAB73BC-B049-4115-A692-8D63A059BFB8}" type="slidenum">
               <a:rPr lang="en-US" dirty="0"/>
-              <a:t>‹nr.›</a:t>
+              <a:t>‹#›</a:t>
             </a:fld>
             <a:endParaRPr lang="en-US" dirty="0"/>
           </a:p>
@@ -9485,7 +9490,7 @@
           <a:p>
             <a:fld id="{A5D3794B-289A-4A80-97D7-111025398D45}" type="datetimeFigureOut">
               <a:rPr lang="en-US" dirty="0"/>
-              <a:t>5/9/2017</a:t>
+              <a:t>5/10/2017</a:t>
             </a:fld>
             <a:endParaRPr lang="en-US" dirty="0"/>
           </a:p>
@@ -9527,7 +9532,7 @@
           <a:p>
             <a:fld id="{4FAB73BC-B049-4115-A692-8D63A059BFB8}" type="slidenum">
               <a:rPr lang="en-US" dirty="0"/>
-              <a:t>‹nr.›</a:t>
+              <a:t>‹#›</a:t>
             </a:fld>
             <a:endParaRPr lang="en-US" dirty="0"/>
           </a:p>
@@ -18378,7 +18383,7 @@
           <a:p>
             <a:fld id="{5A61015F-7CC6-4D0A-9D87-873EA4C304CC}" type="datetimeFigureOut">
               <a:rPr lang="en-US" dirty="0"/>
-              <a:t>5/9/2017</a:t>
+              <a:t>5/10/2017</a:t>
             </a:fld>
             <a:endParaRPr lang="en-US" dirty="0"/>
           </a:p>
@@ -18420,7 +18425,7 @@
           <a:p>
             <a:fld id="{4FAB73BC-B049-4115-A692-8D63A059BFB8}" type="slidenum">
               <a:rPr lang="en-US" dirty="0"/>
-              <a:t>‹nr.›</a:t>
+              <a:t>‹#›</a:t>
             </a:fld>
             <a:endParaRPr lang="en-US" dirty="0"/>
           </a:p>
@@ -18647,7 +18652,7 @@
           <a:p>
             <a:fld id="{93C6A301-0538-44EC-B09D-202E1042A48B}" type="datetimeFigureOut">
               <a:rPr lang="en-US" dirty="0"/>
-              <a:t>5/9/2017</a:t>
+              <a:t>5/10/2017</a:t>
             </a:fld>
             <a:endParaRPr lang="en-US" dirty="0"/>
           </a:p>
@@ -18689,7 +18694,7 @@
           <a:p>
             <a:fld id="{4FAB73BC-B049-4115-A692-8D63A059BFB8}" type="slidenum">
               <a:rPr lang="en-US" dirty="0"/>
-              <a:t>‹nr.›</a:t>
+              <a:t>‹#›</a:t>
             </a:fld>
             <a:endParaRPr lang="en-US" dirty="0"/>
           </a:p>
@@ -19040,7 +19045,7 @@
           <a:p>
             <a:fld id="{D789574A-8875-45EF-8EA2-3CAA0F7ABC4C}" type="datetimeFigureOut">
               <a:rPr lang="en-US" dirty="0"/>
-              <a:t>5/9/2017</a:t>
+              <a:t>5/10/2017</a:t>
             </a:fld>
             <a:endParaRPr lang="en-US" dirty="0"/>
           </a:p>
@@ -19082,7 +19087,7 @@
           <a:p>
             <a:fld id="{4FAB73BC-B049-4115-A692-8D63A059BFB8}" type="slidenum">
               <a:rPr lang="en-US" dirty="0"/>
-              <a:t>‹nr.›</a:t>
+              <a:t>‹#›</a:t>
             </a:fld>
             <a:endParaRPr lang="en-US" dirty="0"/>
           </a:p>
@@ -19153,7 +19158,7 @@
           <a:p>
             <a:fld id="{67EF4D4C-5367-4C26-9E2B-D8088D7FCA81}" type="datetimeFigureOut">
               <a:rPr lang="en-US" dirty="0"/>
-              <a:t>5/9/2017</a:t>
+              <a:t>5/10/2017</a:t>
             </a:fld>
             <a:endParaRPr lang="en-US" dirty="0"/>
           </a:p>
@@ -19195,7 +19200,7 @@
           <a:p>
             <a:fld id="{4FAB73BC-B049-4115-A692-8D63A059BFB8}" type="slidenum">
               <a:rPr lang="en-US" dirty="0"/>
-              <a:t>‹nr.›</a:t>
+              <a:t>‹#›</a:t>
             </a:fld>
             <a:endParaRPr lang="en-US" dirty="0"/>
           </a:p>
@@ -19243,7 +19248,7 @@
           <a:p>
             <a:fld id="{56E91E96-98B0-4413-9547-46F3504108EF}" type="datetimeFigureOut">
               <a:rPr lang="en-US" dirty="0"/>
-              <a:t>5/9/2017</a:t>
+              <a:t>5/10/2017</a:t>
             </a:fld>
             <a:endParaRPr lang="en-US" dirty="0"/>
           </a:p>
@@ -19285,7 +19290,7 @@
           <a:p>
             <a:fld id="{4FAB73BC-B049-4115-A692-8D63A059BFB8}" type="slidenum">
               <a:rPr lang="en-US" dirty="0"/>
-              <a:t>‹nr.›</a:t>
+              <a:t>‹#›</a:t>
             </a:fld>
             <a:endParaRPr lang="en-US" dirty="0"/>
           </a:p>
@@ -19528,7 +19533,7 @@
           <a:p>
             <a:fld id="{05C68B11-C5A8-448C-8CE9-B1A273C79CFC}" type="datetimeFigureOut">
               <a:rPr lang="en-US" dirty="0"/>
-              <a:t>5/9/2017</a:t>
+              <a:t>5/10/2017</a:t>
             </a:fld>
             <a:endParaRPr lang="en-US" dirty="0"/>
           </a:p>
@@ -19570,7 +19575,7 @@
           <a:p>
             <a:fld id="{4FAB73BC-B049-4115-A692-8D63A059BFB8}" type="slidenum">
               <a:rPr lang="en-US" dirty="0"/>
-              <a:t>‹nr.›</a:t>
+              <a:t>‹#›</a:t>
             </a:fld>
             <a:endParaRPr lang="en-US" dirty="0"/>
           </a:p>
@@ -19803,7 +19808,7 @@
           <a:p>
             <a:fld id="{C7616CA0-919D-4A49-9C8A-62FDFB3A5183}" type="datetimeFigureOut">
               <a:rPr lang="en-US" dirty="0"/>
-              <a:t>5/9/2017</a:t>
+              <a:t>5/10/2017</a:t>
             </a:fld>
             <a:endParaRPr lang="en-US" dirty="0"/>
           </a:p>
@@ -19845,7 +19850,7 @@
           <a:p>
             <a:fld id="{867E5644-1E61-4311-A31E-84CB9C7AA8A9}" type="slidenum">
               <a:rPr lang="en-US" dirty="0"/>
-              <a:t>‹nr.›</a:t>
+              <a:t>‹#›</a:t>
             </a:fld>
             <a:endParaRPr lang="en-US" dirty="0"/>
           </a:p>
@@ -20049,7 +20054,7 @@
             <a:fld id="{90298CD5-6C1E-4009-B41F-6DF62E31D3BE}" type="datetimeFigureOut">
               <a:rPr lang="en-US" dirty="0"/>
               <a:pPr/>
-              <a:t>5/9/2017</a:t>
+              <a:t>5/10/2017</a:t>
             </a:fld>
             <a:endParaRPr lang="en-US" dirty="0"/>
           </a:p>
@@ -20132,7 +20137,7 @@
             <a:fld id="{4FAB73BC-B049-4115-A692-8D63A059BFB8}" type="slidenum">
               <a:rPr lang="en-US" dirty="0"/>
               <a:pPr/>
-              <a:t>‹nr.›</a:t>
+              <a:t>‹#›</a:t>
             </a:fld>
             <a:endParaRPr lang="en-US" dirty="0"/>
           </a:p>
@@ -20741,7 +20746,7 @@
             </a:r>
             <a:r>
               <a:rPr lang="en-GB" sz="3200" dirty="0" err="1" smtClean="0"/>
-              <a:t>bliver</a:t>
+              <a:t>blive</a:t>
             </a:r>
             <a:r>
               <a:rPr lang="en-GB" sz="3200" dirty="0" smtClean="0"/>
@@ -20762,9 +20767,11 @@
             <a:endParaRPr lang="en-GB" sz="3200" dirty="0"/>
           </a:p>
           <a:p>
-            <a:pPr lvl="1"/>
+            <a:pPr marL="128016" lvl="1" indent="0">
+              <a:buNone/>
+            </a:pPr>
             <a:r>
-              <a:rPr lang="da-DK" sz="3200" dirty="0"/>
+              <a:rPr lang="da-DK" sz="3200" i="1" dirty="0"/>
               <a:t>"</a:t>
             </a:r>
             <a:r>
@@ -20845,13 +20852,9 @@
             </a:r>
             <a:r>
               <a:rPr lang="da-DK" sz="3200" i="1" dirty="0"/>
-              <a:t>.</a:t>
+              <a:t>."</a:t>
             </a:r>
-            <a:r>
-              <a:rPr lang="da-DK" sz="3200" dirty="0"/>
-              <a:t>"</a:t>
-            </a:r>
-            <a:endParaRPr lang="en-GB" sz="3200" dirty="0"/>
+            <a:endParaRPr lang="en-GB" sz="3200" i="1" dirty="0"/>
           </a:p>
           <a:p>
             <a:pPr lvl="1"/>
@@ -20872,9 +20875,213 @@
   <p:timing>
     <p:tnLst>
       <p:par>
-        <p:cTn id="1" dur="indefinite" restart="never" nodeType="tmRoot"/>
+        <p:cTn id="1" dur="indefinite" restart="never" nodeType="tmRoot">
+          <p:childTnLst>
+            <p:seq concurrent="1" nextAc="seek">
+              <p:cTn id="2" dur="indefinite" nodeType="mainSeq">
+                <p:childTnLst>
+                  <p:par>
+                    <p:cTn id="3" fill="hold">
+                      <p:stCondLst>
+                        <p:cond delay="indefinite"/>
+                      </p:stCondLst>
+                      <p:childTnLst>
+                        <p:par>
+                          <p:cTn id="4" fill="hold">
+                            <p:stCondLst>
+                              <p:cond delay="0"/>
+                            </p:stCondLst>
+                            <p:childTnLst>
+                              <p:par>
+                                <p:cTn id="5" presetID="1" presetClass="entr" presetSubtype="0" fill="hold" grpId="0" nodeType="clickEffect">
+                                  <p:stCondLst>
+                                    <p:cond delay="0"/>
+                                  </p:stCondLst>
+                                  <p:childTnLst>
+                                    <p:set>
+                                      <p:cBhvr>
+                                        <p:cTn id="6" dur="1" fill="hold">
+                                          <p:stCondLst>
+                                            <p:cond delay="0"/>
+                                          </p:stCondLst>
+                                        </p:cTn>
+                                        <p:tgtEl>
+                                          <p:spTgt spid="3">
+                                            <p:txEl>
+                                              <p:pRg st="0" end="0"/>
+                                            </p:txEl>
+                                          </p:spTgt>
+                                        </p:tgtEl>
+                                        <p:attrNameLst>
+                                          <p:attrName>style.visibility</p:attrName>
+                                        </p:attrNameLst>
+                                      </p:cBhvr>
+                                      <p:to>
+                                        <p:strVal val="visible"/>
+                                      </p:to>
+                                    </p:set>
+                                  </p:childTnLst>
+                                </p:cTn>
+                              </p:par>
+                            </p:childTnLst>
+                          </p:cTn>
+                        </p:par>
+                      </p:childTnLst>
+                    </p:cTn>
+                  </p:par>
+                  <p:par>
+                    <p:cTn id="7" fill="hold">
+                      <p:stCondLst>
+                        <p:cond delay="indefinite"/>
+                      </p:stCondLst>
+                      <p:childTnLst>
+                        <p:par>
+                          <p:cTn id="8" fill="hold">
+                            <p:stCondLst>
+                              <p:cond delay="0"/>
+                            </p:stCondLst>
+                            <p:childTnLst>
+                              <p:par>
+                                <p:cTn id="9" presetID="1" presetClass="entr" presetSubtype="0" fill="hold" grpId="0" nodeType="clickEffect">
+                                  <p:stCondLst>
+                                    <p:cond delay="0"/>
+                                  </p:stCondLst>
+                                  <p:childTnLst>
+                                    <p:set>
+                                      <p:cBhvr>
+                                        <p:cTn id="10" dur="1" fill="hold">
+                                          <p:stCondLst>
+                                            <p:cond delay="0"/>
+                                          </p:stCondLst>
+                                        </p:cTn>
+                                        <p:tgtEl>
+                                          <p:spTgt spid="3">
+                                            <p:txEl>
+                                              <p:pRg st="1" end="1"/>
+                                            </p:txEl>
+                                          </p:spTgt>
+                                        </p:tgtEl>
+                                        <p:attrNameLst>
+                                          <p:attrName>style.visibility</p:attrName>
+                                        </p:attrNameLst>
+                                      </p:cBhvr>
+                                      <p:to>
+                                        <p:strVal val="visible"/>
+                                      </p:to>
+                                    </p:set>
+                                  </p:childTnLst>
+                                </p:cTn>
+                              </p:par>
+                            </p:childTnLst>
+                          </p:cTn>
+                        </p:par>
+                      </p:childTnLst>
+                    </p:cTn>
+                  </p:par>
+                  <p:par>
+                    <p:cTn id="11" fill="hold">
+                      <p:stCondLst>
+                        <p:cond delay="indefinite"/>
+                      </p:stCondLst>
+                      <p:childTnLst>
+                        <p:par>
+                          <p:cTn id="12" fill="hold">
+                            <p:stCondLst>
+                              <p:cond delay="0"/>
+                            </p:stCondLst>
+                            <p:childTnLst>
+                              <p:par>
+                                <p:cTn id="13" presetID="1" presetClass="entr" presetSubtype="0" fill="hold" grpId="0" nodeType="clickEffect">
+                                  <p:stCondLst>
+                                    <p:cond delay="0"/>
+                                  </p:stCondLst>
+                                  <p:childTnLst>
+                                    <p:set>
+                                      <p:cBhvr>
+                                        <p:cTn id="14" dur="1" fill="hold">
+                                          <p:stCondLst>
+                                            <p:cond delay="0"/>
+                                          </p:stCondLst>
+                                        </p:cTn>
+                                        <p:tgtEl>
+                                          <p:spTgt spid="3">
+                                            <p:txEl>
+                                              <p:pRg st="2" end="2"/>
+                                            </p:txEl>
+                                          </p:spTgt>
+                                        </p:tgtEl>
+                                        <p:attrNameLst>
+                                          <p:attrName>style.visibility</p:attrName>
+                                        </p:attrNameLst>
+                                      </p:cBhvr>
+                                      <p:to>
+                                        <p:strVal val="visible"/>
+                                      </p:to>
+                                    </p:set>
+                                  </p:childTnLst>
+                                </p:cTn>
+                              </p:par>
+                              <p:par>
+                                <p:cTn id="15" presetID="1" presetClass="entr" presetSubtype="0" fill="hold" grpId="0" nodeType="withEffect">
+                                  <p:stCondLst>
+                                    <p:cond delay="0"/>
+                                  </p:stCondLst>
+                                  <p:childTnLst>
+                                    <p:set>
+                                      <p:cBhvr>
+                                        <p:cTn id="16" dur="1" fill="hold">
+                                          <p:stCondLst>
+                                            <p:cond delay="0"/>
+                                          </p:stCondLst>
+                                        </p:cTn>
+                                        <p:tgtEl>
+                                          <p:spTgt spid="3">
+                                            <p:txEl>
+                                              <p:pRg st="3" end="3"/>
+                                            </p:txEl>
+                                          </p:spTgt>
+                                        </p:tgtEl>
+                                        <p:attrNameLst>
+                                          <p:attrName>style.visibility</p:attrName>
+                                        </p:attrNameLst>
+                                      </p:cBhvr>
+                                      <p:to>
+                                        <p:strVal val="visible"/>
+                                      </p:to>
+                                    </p:set>
+                                  </p:childTnLst>
+                                </p:cTn>
+                              </p:par>
+                            </p:childTnLst>
+                          </p:cTn>
+                        </p:par>
+                      </p:childTnLst>
+                    </p:cTn>
+                  </p:par>
+                </p:childTnLst>
+              </p:cTn>
+              <p:prevCondLst>
+                <p:cond evt="onPrev" delay="0">
+                  <p:tgtEl>
+                    <p:sldTgt/>
+                  </p:tgtEl>
+                </p:cond>
+              </p:prevCondLst>
+              <p:nextCondLst>
+                <p:cond evt="onNext" delay="0">
+                  <p:tgtEl>
+                    <p:sldTgt/>
+                  </p:tgtEl>
+                </p:cond>
+              </p:nextCondLst>
+            </p:seq>
+          </p:childTnLst>
+        </p:cTn>
       </p:par>
     </p:tnLst>
+    <p:bldLst>
+      <p:bldP spid="3" grpId="0" uiExpand="1" build="p"/>
+    </p:bldLst>
   </p:timing>
 </p:sld>
 </file>
@@ -20921,9 +21128,9 @@
       </p:sp>
       <p:pic>
         <p:nvPicPr>
-          <p:cNvPr id="4" name="Pladsholder til indhold 3" descr="https://upload.wikimedia.org/wikipedia/commons/thumb/e/e9/Decorator_UML_class_diagram.svg/960px-Decorator_UML_class_diagram.svg.png"/>
+          <p:cNvPr id="5" name="Content Placeholder 4"/>
           <p:cNvPicPr>
-            <a:picLocks noGrp="1"/>
+            <a:picLocks noGrp="1" noChangeAspect="1"/>
           </p:cNvPicPr>
           <p:nvPr>
             <p:ph idx="1"/>
@@ -20937,23 +21144,15 @@
               </a:ext>
             </a:extLst>
           </a:blip>
-          <a:srcRect/>
           <a:stretch>
             <a:fillRect/>
           </a:stretch>
         </p:blipFill>
-        <p:spPr bwMode="auto">
+        <p:spPr>
           <a:xfrm>
-            <a:off x="2427273" y="585216"/>
-            <a:ext cx="6913782" cy="5723509"/>
+            <a:off x="3179135" y="298182"/>
+            <a:ext cx="6379648" cy="6265726"/>
           </a:xfrm>
-          <a:prstGeom prst="rect">
-            <a:avLst/>
-          </a:prstGeom>
-          <a:noFill/>
-          <a:ln>
-            <a:noFill/>
-          </a:ln>
         </p:spPr>
       </p:pic>
     </p:spTree>
@@ -20993,6 +21192,39 @@
           <a:chExt cx="0" cy="0"/>
         </a:xfrm>
       </p:grpSpPr>
+      <p:pic>
+        <p:nvPicPr>
+          <p:cNvPr id="8" name="Pladsholder til indhold 3" descr="C:\UniProjects\SWD\Decorator\SWD_DecoratorPattern\DecoratorPattern_Monster.png"/>
+          <p:cNvPicPr>
+            <a:picLocks/>
+          </p:cNvPicPr>
+          <p:nvPr/>
+        </p:nvPicPr>
+        <p:blipFill rotWithShape="1">
+          <a:blip r:embed="rId2">
+            <a:extLst>
+              <a:ext uri="{28A0092B-C50C-407E-A947-70E740481C1C}">
+                <a14:useLocalDpi xmlns:a14="http://schemas.microsoft.com/office/drawing/2010/main" val="0"/>
+              </a:ext>
+            </a:extLst>
+          </a:blip>
+          <a:srcRect l="38429" t="65341" r="33451"/>
+          <a:stretch/>
+        </p:blipFill>
+        <p:spPr bwMode="auto">
+          <a:xfrm>
+            <a:off x="7223846" y="4423144"/>
+            <a:ext cx="1892595" cy="2117653"/>
+          </a:xfrm>
+          <a:prstGeom prst="rect">
+            <a:avLst/>
+          </a:prstGeom>
+          <a:noFill/>
+          <a:ln>
+            <a:noFill/>
+          </a:ln>
+        </p:spPr>
+      </p:pic>
       <p:sp>
         <p:nvSpPr>
           <p:cNvPr id="2" name="Titel 1"/>
@@ -21026,7 +21258,7 @@
             <p:ph idx="1"/>
           </p:nvPr>
         </p:nvPicPr>
-        <p:blipFill>
+        <p:blipFill rotWithShape="1">
           <a:blip r:embed="rId2">
             <a:extLst>
               <a:ext uri="{28A0092B-C50C-407E-A947-70E740481C1C}">
@@ -21034,15 +21266,112 @@
               </a:ext>
             </a:extLst>
           </a:blip>
-          <a:srcRect/>
-          <a:stretch>
-            <a:fillRect/>
-          </a:stretch>
+          <a:srcRect l="68339" t="65399"/>
+          <a:stretch/>
         </p:blipFill>
         <p:spPr bwMode="auto">
           <a:xfrm>
-            <a:off x="3619394" y="212036"/>
-            <a:ext cx="6730553" cy="6109942"/>
+            <a:off x="9141300" y="4423144"/>
+            <a:ext cx="2130979" cy="2114109"/>
+          </a:xfrm>
+          <a:prstGeom prst="rect">
+            <a:avLst/>
+          </a:prstGeom>
+          <a:noFill/>
+          <a:ln>
+            <a:noFill/>
+          </a:ln>
+        </p:spPr>
+      </p:pic>
+      <p:pic>
+        <p:nvPicPr>
+          <p:cNvPr id="6" name="Pladsholder til indhold 3" descr="C:\UniProjects\SWD\Decorator\SWD_DecoratorPattern\DecoratorPattern_Monster.png"/>
+          <p:cNvPicPr>
+            <a:picLocks/>
+          </p:cNvPicPr>
+          <p:nvPr/>
+        </p:nvPicPr>
+        <p:blipFill rotWithShape="1">
+          <a:blip r:embed="rId2">
+            <a:extLst>
+              <a:ext uri="{28A0092B-C50C-407E-A947-70E740481C1C}">
+                <a14:useLocalDpi xmlns:a14="http://schemas.microsoft.com/office/drawing/2010/main" val="0"/>
+              </a:ext>
+            </a:extLst>
+          </a:blip>
+          <a:srcRect t="23619" r="54410" b="33050"/>
+          <a:stretch/>
+        </p:blipFill>
+        <p:spPr bwMode="auto">
+          <a:xfrm>
+            <a:off x="4860757" y="1898031"/>
+            <a:ext cx="3068486" cy="2647508"/>
+          </a:xfrm>
+          <a:prstGeom prst="rect">
+            <a:avLst/>
+          </a:prstGeom>
+          <a:noFill/>
+          <a:ln>
+            <a:noFill/>
+          </a:ln>
+        </p:spPr>
+      </p:pic>
+      <p:pic>
+        <p:nvPicPr>
+          <p:cNvPr id="7" name="Pladsholder til indhold 3" descr="C:\UniProjects\SWD\Decorator\SWD_DecoratorPattern\DecoratorPattern_Monster.png"/>
+          <p:cNvPicPr>
+            <a:picLocks/>
+          </p:cNvPicPr>
+          <p:nvPr/>
+        </p:nvPicPr>
+        <p:blipFill rotWithShape="1">
+          <a:blip r:embed="rId2">
+            <a:extLst>
+              <a:ext uri="{28A0092B-C50C-407E-A947-70E740481C1C}">
+                <a14:useLocalDpi xmlns:a14="http://schemas.microsoft.com/office/drawing/2010/main" val="0"/>
+              </a:ext>
+            </a:extLst>
+          </a:blip>
+          <a:srcRect l="48855" t="16267" b="34485"/>
+          <a:stretch/>
+        </p:blipFill>
+        <p:spPr bwMode="auto">
+          <a:xfrm>
+            <a:off x="7854811" y="1435396"/>
+            <a:ext cx="3442328" cy="3009014"/>
+          </a:xfrm>
+          <a:prstGeom prst="rect">
+            <a:avLst/>
+          </a:prstGeom>
+          <a:noFill/>
+          <a:ln>
+            <a:noFill/>
+          </a:ln>
+        </p:spPr>
+      </p:pic>
+      <p:pic>
+        <p:nvPicPr>
+          <p:cNvPr id="5" name="Pladsholder til indhold 3" descr="C:\UniProjects\SWD\Decorator\SWD_DecoratorPattern\DecoratorPattern_Monster.png"/>
+          <p:cNvPicPr>
+            <a:picLocks/>
+          </p:cNvPicPr>
+          <p:nvPr/>
+        </p:nvPicPr>
+        <p:blipFill rotWithShape="1">
+          <a:blip r:embed="rId2">
+            <a:extLst>
+              <a:ext uri="{28A0092B-C50C-407E-A947-70E740481C1C}">
+                <a14:useLocalDpi xmlns:a14="http://schemas.microsoft.com/office/drawing/2010/main" val="0"/>
+              </a:ext>
+            </a:extLst>
+          </a:blip>
+          <a:srcRect l="37139" t="3473" r="37111" b="75992"/>
+          <a:stretch/>
+        </p:blipFill>
+        <p:spPr bwMode="auto">
+          <a:xfrm>
+            <a:off x="7062689" y="643389"/>
+            <a:ext cx="1733107" cy="1254642"/>
           </a:xfrm>
           <a:prstGeom prst="rect">
             <a:avLst/>
@@ -21066,7 +21395,255 @@
   <p:timing>
     <p:tnLst>
       <p:par>
-        <p:cTn id="1" dur="indefinite" restart="never" nodeType="tmRoot"/>
+        <p:cTn id="1" dur="indefinite" restart="never" nodeType="tmRoot">
+          <p:childTnLst>
+            <p:seq concurrent="1" nextAc="seek">
+              <p:cTn id="2" dur="indefinite" nodeType="mainSeq">
+                <p:childTnLst>
+                  <p:par>
+                    <p:cTn id="3" fill="hold">
+                      <p:stCondLst>
+                        <p:cond delay="indefinite"/>
+                      </p:stCondLst>
+                      <p:childTnLst>
+                        <p:par>
+                          <p:cTn id="4" fill="hold">
+                            <p:stCondLst>
+                              <p:cond delay="0"/>
+                            </p:stCondLst>
+                            <p:childTnLst>
+                              <p:par>
+                                <p:cTn id="5" presetID="1" presetClass="entr" presetSubtype="0" fill="hold" nodeType="clickEffect">
+                                  <p:stCondLst>
+                                    <p:cond delay="0"/>
+                                  </p:stCondLst>
+                                  <p:childTnLst>
+                                    <p:set>
+                                      <p:cBhvr>
+                                        <p:cTn id="6" dur="1" fill="hold">
+                                          <p:stCondLst>
+                                            <p:cond delay="0"/>
+                                          </p:stCondLst>
+                                        </p:cTn>
+                                        <p:tgtEl>
+                                          <p:spTgt spid="5"/>
+                                        </p:tgtEl>
+                                        <p:attrNameLst>
+                                          <p:attrName>style.visibility</p:attrName>
+                                        </p:attrNameLst>
+                                      </p:cBhvr>
+                                      <p:to>
+                                        <p:strVal val="visible"/>
+                                      </p:to>
+                                    </p:set>
+                                  </p:childTnLst>
+                                </p:cTn>
+                              </p:par>
+                            </p:childTnLst>
+                          </p:cTn>
+                        </p:par>
+                      </p:childTnLst>
+                    </p:cTn>
+                  </p:par>
+                  <p:par>
+                    <p:cTn id="7" fill="hold">
+                      <p:stCondLst>
+                        <p:cond delay="indefinite"/>
+                      </p:stCondLst>
+                      <p:childTnLst>
+                        <p:par>
+                          <p:cTn id="8" fill="hold">
+                            <p:stCondLst>
+                              <p:cond delay="0"/>
+                            </p:stCondLst>
+                            <p:childTnLst>
+                              <p:par>
+                                <p:cTn id="9" presetID="1" presetClass="entr" presetSubtype="0" fill="hold" nodeType="clickEffect">
+                                  <p:stCondLst>
+                                    <p:cond delay="0"/>
+                                  </p:stCondLst>
+                                  <p:childTnLst>
+                                    <p:set>
+                                      <p:cBhvr>
+                                        <p:cTn id="10" dur="1" fill="hold">
+                                          <p:stCondLst>
+                                            <p:cond delay="0"/>
+                                          </p:stCondLst>
+                                        </p:cTn>
+                                        <p:tgtEl>
+                                          <p:spTgt spid="6"/>
+                                        </p:tgtEl>
+                                        <p:attrNameLst>
+                                          <p:attrName>style.visibility</p:attrName>
+                                        </p:attrNameLst>
+                                      </p:cBhvr>
+                                      <p:to>
+                                        <p:strVal val="visible"/>
+                                      </p:to>
+                                    </p:set>
+                                  </p:childTnLst>
+                                </p:cTn>
+                              </p:par>
+                            </p:childTnLst>
+                          </p:cTn>
+                        </p:par>
+                      </p:childTnLst>
+                    </p:cTn>
+                  </p:par>
+                  <p:par>
+                    <p:cTn id="11" fill="hold">
+                      <p:stCondLst>
+                        <p:cond delay="indefinite"/>
+                      </p:stCondLst>
+                      <p:childTnLst>
+                        <p:par>
+                          <p:cTn id="12" fill="hold">
+                            <p:stCondLst>
+                              <p:cond delay="0"/>
+                            </p:stCondLst>
+                            <p:childTnLst>
+                              <p:par>
+                                <p:cTn id="13" presetID="1" presetClass="entr" presetSubtype="0" fill="hold" nodeType="clickEffect">
+                                  <p:stCondLst>
+                                    <p:cond delay="0"/>
+                                  </p:stCondLst>
+                                  <p:childTnLst>
+                                    <p:set>
+                                      <p:cBhvr>
+                                        <p:cTn id="14" dur="1" fill="hold">
+                                          <p:stCondLst>
+                                            <p:cond delay="0"/>
+                                          </p:stCondLst>
+                                        </p:cTn>
+                                        <p:tgtEl>
+                                          <p:spTgt spid="7"/>
+                                        </p:tgtEl>
+                                        <p:attrNameLst>
+                                          <p:attrName>style.visibility</p:attrName>
+                                        </p:attrNameLst>
+                                      </p:cBhvr>
+                                      <p:to>
+                                        <p:strVal val="visible"/>
+                                      </p:to>
+                                    </p:set>
+                                  </p:childTnLst>
+                                </p:cTn>
+                              </p:par>
+                            </p:childTnLst>
+                          </p:cTn>
+                        </p:par>
+                      </p:childTnLst>
+                    </p:cTn>
+                  </p:par>
+                  <p:par>
+                    <p:cTn id="15" fill="hold">
+                      <p:stCondLst>
+                        <p:cond delay="indefinite"/>
+                      </p:stCondLst>
+                      <p:childTnLst>
+                        <p:par>
+                          <p:cTn id="16" fill="hold">
+                            <p:stCondLst>
+                              <p:cond delay="0"/>
+                            </p:stCondLst>
+                            <p:childTnLst>
+                              <p:par>
+                                <p:cTn id="17" presetID="1" presetClass="entr" presetSubtype="0" fill="hold" nodeType="clickEffect">
+                                  <p:stCondLst>
+                                    <p:cond delay="0"/>
+                                  </p:stCondLst>
+                                  <p:childTnLst>
+                                    <p:set>
+                                      <p:cBhvr>
+                                        <p:cTn id="18" dur="1" fill="hold">
+                                          <p:stCondLst>
+                                            <p:cond delay="0"/>
+                                          </p:stCondLst>
+                                        </p:cTn>
+                                        <p:tgtEl>
+                                          <p:spTgt spid="8"/>
+                                        </p:tgtEl>
+                                        <p:attrNameLst>
+                                          <p:attrName>style.visibility</p:attrName>
+                                        </p:attrNameLst>
+                                      </p:cBhvr>
+                                      <p:to>
+                                        <p:strVal val="visible"/>
+                                      </p:to>
+                                    </p:set>
+                                  </p:childTnLst>
+                                </p:cTn>
+                              </p:par>
+                            </p:childTnLst>
+                          </p:cTn>
+                        </p:par>
+                      </p:childTnLst>
+                    </p:cTn>
+                  </p:par>
+                  <p:par>
+                    <p:cTn id="19" fill="hold">
+                      <p:stCondLst>
+                        <p:cond delay="indefinite"/>
+                      </p:stCondLst>
+                      <p:childTnLst>
+                        <p:par>
+                          <p:cTn id="20" fill="hold">
+                            <p:stCondLst>
+                              <p:cond delay="0"/>
+                            </p:stCondLst>
+                            <p:childTnLst>
+                              <p:par>
+                                <p:cTn id="21" presetID="1" presetClass="entr" presetSubtype="0" fill="hold" nodeType="clickEffect">
+                                  <p:stCondLst>
+                                    <p:cond delay="0"/>
+                                  </p:stCondLst>
+                                  <p:childTnLst>
+                                    <p:set>
+                                      <p:cBhvr>
+                                        <p:cTn id="22" dur="1" fill="hold">
+                                          <p:stCondLst>
+                                            <p:cond delay="0"/>
+                                          </p:stCondLst>
+                                        </p:cTn>
+                                        <p:tgtEl>
+                                          <p:spTgt spid="4"/>
+                                        </p:tgtEl>
+                                        <p:attrNameLst>
+                                          <p:attrName>style.visibility</p:attrName>
+                                        </p:attrNameLst>
+                                      </p:cBhvr>
+                                      <p:to>
+                                        <p:strVal val="visible"/>
+                                      </p:to>
+                                    </p:set>
+                                  </p:childTnLst>
+                                </p:cTn>
+                              </p:par>
+                            </p:childTnLst>
+                          </p:cTn>
+                        </p:par>
+                      </p:childTnLst>
+                    </p:cTn>
+                  </p:par>
+                </p:childTnLst>
+              </p:cTn>
+              <p:prevCondLst>
+                <p:cond evt="onPrev" delay="0">
+                  <p:tgtEl>
+                    <p:sldTgt/>
+                  </p:tgtEl>
+                </p:cond>
+              </p:prevCondLst>
+              <p:nextCondLst>
+                <p:cond evt="onNext" delay="0">
+                  <p:tgtEl>
+                    <p:sldTgt/>
+                  </p:tgtEl>
+                </p:cond>
+              </p:nextCondLst>
+            </p:seq>
+          </p:childTnLst>
+        </p:cTn>
       </p:par>
     </p:tnLst>
   </p:timing>
@@ -21437,6 +22014,13 @@
   <p:clrMapOvr>
     <a:masterClrMapping/>
   </p:clrMapOvr>
+  <p:timing>
+    <p:tnLst>
+      <p:par>
+        <p:cTn id="1" dur="indefinite" restart="never" nodeType="tmRoot"/>
+      </p:par>
+    </p:tnLst>
+  </p:timing>
 </p:sld>
 </file>
 
@@ -21528,6 +22112,13 @@
   <p:clrMapOvr>
     <a:masterClrMapping/>
   </p:clrMapOvr>
+  <p:timing>
+    <p:tnLst>
+      <p:par>
+        <p:cTn id="1" dur="indefinite" restart="never" nodeType="tmRoot"/>
+      </p:par>
+    </p:tnLst>
+  </p:timing>
 </p:sld>
 </file>
 
@@ -21626,6 +22217,13 @@
   <p:clrMapOvr>
     <a:masterClrMapping/>
   </p:clrMapOvr>
+  <p:timing>
+    <p:tnLst>
+      <p:par>
+        <p:cTn id="1" dur="indefinite" restart="never" nodeType="tmRoot"/>
+      </p:par>
+    </p:tnLst>
+  </p:timing>
 </p:sld>
 </file>
 

</xml_diff>

<commit_message>
jeg ved ikke hvad er ændret, men den siger der er ændret noget, så jeg må hellere pushe :)
</commit_message>
<xml_diff>
--- a/Decorator Pattern.pptx
+++ b/Decorator Pattern.pptx
@@ -4,6 +4,9 @@
   <p:sldMasterIdLst>
     <p:sldMasterId id="2147483648" r:id="rId3"/>
   </p:sldMasterIdLst>
+  <p:notesMasterIdLst>
+    <p:notesMasterId r:id="rId10"/>
+  </p:notesMasterIdLst>
   <p:sldIdLst>
     <p:sldId id="256" r:id="rId4"/>
     <p:sldId id="257" r:id="rId5"/>
@@ -115,6 +118,860 @@
     </p:ext>
   </p:extLst>
 </p:presentation>
+</file>
+
+<file path=ppt/notesMasters/notesMaster1.xml><?xml version="1.0" encoding="utf-8"?>
+<p:notesMaster xmlns:a="http://schemas.openxmlformats.org/drawingml/2006/main" xmlns:r="http://schemas.openxmlformats.org/officeDocument/2006/relationships" xmlns:p="http://schemas.openxmlformats.org/presentationml/2006/main">
+  <p:cSld>
+    <p:bg>
+      <p:bgRef idx="1001">
+        <a:schemeClr val="bg1"/>
+      </p:bgRef>
+    </p:bg>
+    <p:spTree>
+      <p:nvGrpSpPr>
+        <p:cNvPr id="1" name=""/>
+        <p:cNvGrpSpPr/>
+        <p:nvPr/>
+      </p:nvGrpSpPr>
+      <p:grpSpPr>
+        <a:xfrm>
+          <a:off x="0" y="0"/>
+          <a:ext cx="0" cy="0"/>
+          <a:chOff x="0" y="0"/>
+          <a:chExt cx="0" cy="0"/>
+        </a:xfrm>
+      </p:grpSpPr>
+      <p:sp>
+        <p:nvSpPr>
+          <p:cNvPr id="2" name="Header Placeholder 1"/>
+          <p:cNvSpPr>
+            <a:spLocks noGrp="1"/>
+          </p:cNvSpPr>
+          <p:nvPr>
+            <p:ph type="hdr" sz="quarter"/>
+          </p:nvPr>
+        </p:nvSpPr>
+        <p:spPr>
+          <a:xfrm>
+            <a:off x="0" y="0"/>
+            <a:ext cx="2971800" cy="458788"/>
+          </a:xfrm>
+          <a:prstGeom prst="rect">
+            <a:avLst/>
+          </a:prstGeom>
+        </p:spPr>
+        <p:txBody>
+          <a:bodyPr vert="horz" lIns="91440" tIns="45720" rIns="91440" bIns="45720" rtlCol="0"/>
+          <a:lstStyle>
+            <a:lvl1pPr algn="l">
+              <a:defRPr sz="1200"/>
+            </a:lvl1pPr>
+          </a:lstStyle>
+          <a:p>
+            <a:endParaRPr lang="da-DK"/>
+          </a:p>
+        </p:txBody>
+      </p:sp>
+      <p:sp>
+        <p:nvSpPr>
+          <p:cNvPr id="3" name="Date Placeholder 2"/>
+          <p:cNvSpPr>
+            <a:spLocks noGrp="1"/>
+          </p:cNvSpPr>
+          <p:nvPr>
+            <p:ph type="dt" idx="1"/>
+          </p:nvPr>
+        </p:nvSpPr>
+        <p:spPr>
+          <a:xfrm>
+            <a:off x="3884613" y="0"/>
+            <a:ext cx="2971800" cy="458788"/>
+          </a:xfrm>
+          <a:prstGeom prst="rect">
+            <a:avLst/>
+          </a:prstGeom>
+        </p:spPr>
+        <p:txBody>
+          <a:bodyPr vert="horz" lIns="91440" tIns="45720" rIns="91440" bIns="45720" rtlCol="0"/>
+          <a:lstStyle>
+            <a:lvl1pPr algn="r">
+              <a:defRPr sz="1200"/>
+            </a:lvl1pPr>
+          </a:lstStyle>
+          <a:p>
+            <a:fld id="{FD6D676A-4617-48F0-B571-77D4A7FE5D51}" type="datetimeFigureOut">
+              <a:rPr lang="da-DK" smtClean="0"/>
+              <a:t>12-05-2017</a:t>
+            </a:fld>
+            <a:endParaRPr lang="da-DK"/>
+          </a:p>
+        </p:txBody>
+      </p:sp>
+      <p:sp>
+        <p:nvSpPr>
+          <p:cNvPr id="4" name="Slide Image Placeholder 3"/>
+          <p:cNvSpPr>
+            <a:spLocks noGrp="1" noRot="1" noChangeAspect="1"/>
+          </p:cNvSpPr>
+          <p:nvPr>
+            <p:ph type="sldImg" idx="2"/>
+          </p:nvPr>
+        </p:nvSpPr>
+        <p:spPr>
+          <a:xfrm>
+            <a:off x="685800" y="1143000"/>
+            <a:ext cx="5486400" cy="3086100"/>
+          </a:xfrm>
+          <a:prstGeom prst="rect">
+            <a:avLst/>
+          </a:prstGeom>
+          <a:noFill/>
+          <a:ln w="12700">
+            <a:solidFill>
+              <a:prstClr val="black"/>
+            </a:solidFill>
+          </a:ln>
+        </p:spPr>
+        <p:txBody>
+          <a:bodyPr vert="horz" lIns="91440" tIns="45720" rIns="91440" bIns="45720" rtlCol="0" anchor="ctr"/>
+          <a:lstStyle/>
+          <a:p>
+            <a:endParaRPr lang="da-DK"/>
+          </a:p>
+        </p:txBody>
+      </p:sp>
+      <p:sp>
+        <p:nvSpPr>
+          <p:cNvPr id="5" name="Notes Placeholder 4"/>
+          <p:cNvSpPr>
+            <a:spLocks noGrp="1"/>
+          </p:cNvSpPr>
+          <p:nvPr>
+            <p:ph type="body" sz="quarter" idx="3"/>
+          </p:nvPr>
+        </p:nvSpPr>
+        <p:spPr>
+          <a:xfrm>
+            <a:off x="685800" y="4400550"/>
+            <a:ext cx="5486400" cy="3600450"/>
+          </a:xfrm>
+          <a:prstGeom prst="rect">
+            <a:avLst/>
+          </a:prstGeom>
+        </p:spPr>
+        <p:txBody>
+          <a:bodyPr vert="horz" lIns="91440" tIns="45720" rIns="91440" bIns="45720" rtlCol="0"/>
+          <a:lstStyle/>
+          <a:p>
+            <a:pPr lvl="0"/>
+            <a:r>
+              <a:rPr lang="en-US" smtClean="0"/>
+              <a:t>Click to edit Master text styles</a:t>
+            </a:r>
+          </a:p>
+          <a:p>
+            <a:pPr lvl="1"/>
+            <a:r>
+              <a:rPr lang="en-US" smtClean="0"/>
+              <a:t>Second level</a:t>
+            </a:r>
+          </a:p>
+          <a:p>
+            <a:pPr lvl="2"/>
+            <a:r>
+              <a:rPr lang="en-US" smtClean="0"/>
+              <a:t>Third level</a:t>
+            </a:r>
+          </a:p>
+          <a:p>
+            <a:pPr lvl="3"/>
+            <a:r>
+              <a:rPr lang="en-US" smtClean="0"/>
+              <a:t>Fourth level</a:t>
+            </a:r>
+          </a:p>
+          <a:p>
+            <a:pPr lvl="4"/>
+            <a:r>
+              <a:rPr lang="en-US" smtClean="0"/>
+              <a:t>Fifth level</a:t>
+            </a:r>
+            <a:endParaRPr lang="da-DK"/>
+          </a:p>
+        </p:txBody>
+      </p:sp>
+      <p:sp>
+        <p:nvSpPr>
+          <p:cNvPr id="6" name="Footer Placeholder 5"/>
+          <p:cNvSpPr>
+            <a:spLocks noGrp="1"/>
+          </p:cNvSpPr>
+          <p:nvPr>
+            <p:ph type="ftr" sz="quarter" idx="4"/>
+          </p:nvPr>
+        </p:nvSpPr>
+        <p:spPr>
+          <a:xfrm>
+            <a:off x="0" y="8685213"/>
+            <a:ext cx="2971800" cy="458787"/>
+          </a:xfrm>
+          <a:prstGeom prst="rect">
+            <a:avLst/>
+          </a:prstGeom>
+        </p:spPr>
+        <p:txBody>
+          <a:bodyPr vert="horz" lIns="91440" tIns="45720" rIns="91440" bIns="45720" rtlCol="0" anchor="b"/>
+          <a:lstStyle>
+            <a:lvl1pPr algn="l">
+              <a:defRPr sz="1200"/>
+            </a:lvl1pPr>
+          </a:lstStyle>
+          <a:p>
+            <a:endParaRPr lang="da-DK"/>
+          </a:p>
+        </p:txBody>
+      </p:sp>
+      <p:sp>
+        <p:nvSpPr>
+          <p:cNvPr id="7" name="Slide Number Placeholder 6"/>
+          <p:cNvSpPr>
+            <a:spLocks noGrp="1"/>
+          </p:cNvSpPr>
+          <p:nvPr>
+            <p:ph type="sldNum" sz="quarter" idx="5"/>
+          </p:nvPr>
+        </p:nvSpPr>
+        <p:spPr>
+          <a:xfrm>
+            <a:off x="3884613" y="8685213"/>
+            <a:ext cx="2971800" cy="458787"/>
+          </a:xfrm>
+          <a:prstGeom prst="rect">
+            <a:avLst/>
+          </a:prstGeom>
+        </p:spPr>
+        <p:txBody>
+          <a:bodyPr vert="horz" lIns="91440" tIns="45720" rIns="91440" bIns="45720" rtlCol="0" anchor="b"/>
+          <a:lstStyle>
+            <a:lvl1pPr algn="r">
+              <a:defRPr sz="1200"/>
+            </a:lvl1pPr>
+          </a:lstStyle>
+          <a:p>
+            <a:fld id="{3F7897CC-D6E9-4611-977B-4B8E9DF0D79A}" type="slidenum">
+              <a:rPr lang="da-DK" smtClean="0"/>
+              <a:t>‹#›</a:t>
+            </a:fld>
+            <a:endParaRPr lang="da-DK"/>
+          </a:p>
+        </p:txBody>
+      </p:sp>
+    </p:spTree>
+    <p:extLst>
+      <p:ext uri="{BB962C8B-B14F-4D97-AF65-F5344CB8AC3E}">
+        <p14:creationId xmlns:p14="http://schemas.microsoft.com/office/powerpoint/2010/main" val="636143406"/>
+      </p:ext>
+    </p:extLst>
+  </p:cSld>
+  <p:clrMap bg1="lt1" tx1="dk1" bg2="lt2" tx2="dk2" accent1="accent1" accent2="accent2" accent3="accent3" accent4="accent4" accent5="accent5" accent6="accent6" hlink="hlink" folHlink="folHlink"/>
+  <p:notesStyle>
+    <a:lvl1pPr marL="0" algn="l" defTabSz="914400" rtl="0" eaLnBrk="1" latinLnBrk="0" hangingPunct="1">
+      <a:defRPr sz="1200" kern="1200">
+        <a:solidFill>
+          <a:schemeClr val="tx1"/>
+        </a:solidFill>
+        <a:latin typeface="+mn-lt"/>
+        <a:ea typeface="+mn-ea"/>
+        <a:cs typeface="+mn-cs"/>
+      </a:defRPr>
+    </a:lvl1pPr>
+    <a:lvl2pPr marL="457200" algn="l" defTabSz="914400" rtl="0" eaLnBrk="1" latinLnBrk="0" hangingPunct="1">
+      <a:defRPr sz="1200" kern="1200">
+        <a:solidFill>
+          <a:schemeClr val="tx1"/>
+        </a:solidFill>
+        <a:latin typeface="+mn-lt"/>
+        <a:ea typeface="+mn-ea"/>
+        <a:cs typeface="+mn-cs"/>
+      </a:defRPr>
+    </a:lvl2pPr>
+    <a:lvl3pPr marL="914400" algn="l" defTabSz="914400" rtl="0" eaLnBrk="1" latinLnBrk="0" hangingPunct="1">
+      <a:defRPr sz="1200" kern="1200">
+        <a:solidFill>
+          <a:schemeClr val="tx1"/>
+        </a:solidFill>
+        <a:latin typeface="+mn-lt"/>
+        <a:ea typeface="+mn-ea"/>
+        <a:cs typeface="+mn-cs"/>
+      </a:defRPr>
+    </a:lvl3pPr>
+    <a:lvl4pPr marL="1371600" algn="l" defTabSz="914400" rtl="0" eaLnBrk="1" latinLnBrk="0" hangingPunct="1">
+      <a:defRPr sz="1200" kern="1200">
+        <a:solidFill>
+          <a:schemeClr val="tx1"/>
+        </a:solidFill>
+        <a:latin typeface="+mn-lt"/>
+        <a:ea typeface="+mn-ea"/>
+        <a:cs typeface="+mn-cs"/>
+      </a:defRPr>
+    </a:lvl4pPr>
+    <a:lvl5pPr marL="1828800" algn="l" defTabSz="914400" rtl="0" eaLnBrk="1" latinLnBrk="0" hangingPunct="1">
+      <a:defRPr sz="1200" kern="1200">
+        <a:solidFill>
+          <a:schemeClr val="tx1"/>
+        </a:solidFill>
+        <a:latin typeface="+mn-lt"/>
+        <a:ea typeface="+mn-ea"/>
+        <a:cs typeface="+mn-cs"/>
+      </a:defRPr>
+    </a:lvl5pPr>
+    <a:lvl6pPr marL="2286000" algn="l" defTabSz="914400" rtl="0" eaLnBrk="1" latinLnBrk="0" hangingPunct="1">
+      <a:defRPr sz="1200" kern="1200">
+        <a:solidFill>
+          <a:schemeClr val="tx1"/>
+        </a:solidFill>
+        <a:latin typeface="+mn-lt"/>
+        <a:ea typeface="+mn-ea"/>
+        <a:cs typeface="+mn-cs"/>
+      </a:defRPr>
+    </a:lvl6pPr>
+    <a:lvl7pPr marL="2743200" algn="l" defTabSz="914400" rtl="0" eaLnBrk="1" latinLnBrk="0" hangingPunct="1">
+      <a:defRPr sz="1200" kern="1200">
+        <a:solidFill>
+          <a:schemeClr val="tx1"/>
+        </a:solidFill>
+        <a:latin typeface="+mn-lt"/>
+        <a:ea typeface="+mn-ea"/>
+        <a:cs typeface="+mn-cs"/>
+      </a:defRPr>
+    </a:lvl7pPr>
+    <a:lvl8pPr marL="3200400" algn="l" defTabSz="914400" rtl="0" eaLnBrk="1" latinLnBrk="0" hangingPunct="1">
+      <a:defRPr sz="1200" kern="1200">
+        <a:solidFill>
+          <a:schemeClr val="tx1"/>
+        </a:solidFill>
+        <a:latin typeface="+mn-lt"/>
+        <a:ea typeface="+mn-ea"/>
+        <a:cs typeface="+mn-cs"/>
+      </a:defRPr>
+    </a:lvl8pPr>
+    <a:lvl9pPr marL="3657600" algn="l" defTabSz="914400" rtl="0" eaLnBrk="1" latinLnBrk="0" hangingPunct="1">
+      <a:defRPr sz="1200" kern="1200">
+        <a:solidFill>
+          <a:schemeClr val="tx1"/>
+        </a:solidFill>
+        <a:latin typeface="+mn-lt"/>
+        <a:ea typeface="+mn-ea"/>
+        <a:cs typeface="+mn-cs"/>
+      </a:defRPr>
+    </a:lvl9pPr>
+  </p:notesStyle>
+</p:notesMaster>
+</file>
+
+<file path=ppt/notesSlides/notesSlide1.xml><?xml version="1.0" encoding="utf-8"?>
+<p:notes xmlns:a="http://schemas.openxmlformats.org/drawingml/2006/main" xmlns:r="http://schemas.openxmlformats.org/officeDocument/2006/relationships" xmlns:p="http://schemas.openxmlformats.org/presentationml/2006/main">
+  <p:cSld>
+    <p:spTree>
+      <p:nvGrpSpPr>
+        <p:cNvPr id="1" name=""/>
+        <p:cNvGrpSpPr/>
+        <p:nvPr/>
+      </p:nvGrpSpPr>
+      <p:grpSpPr>
+        <a:xfrm>
+          <a:off x="0" y="0"/>
+          <a:ext cx="0" cy="0"/>
+          <a:chOff x="0" y="0"/>
+          <a:chExt cx="0" cy="0"/>
+        </a:xfrm>
+      </p:grpSpPr>
+      <p:sp>
+        <p:nvSpPr>
+          <p:cNvPr id="2" name="Slide Image Placeholder 1"/>
+          <p:cNvSpPr>
+            <a:spLocks noGrp="1" noRot="1" noChangeAspect="1"/>
+          </p:cNvSpPr>
+          <p:nvPr>
+            <p:ph type="sldImg"/>
+          </p:nvPr>
+        </p:nvSpPr>
+        <p:spPr/>
+      </p:sp>
+      <p:sp>
+        <p:nvSpPr>
+          <p:cNvPr id="3" name="Notes Placeholder 2"/>
+          <p:cNvSpPr>
+            <a:spLocks noGrp="1"/>
+          </p:cNvSpPr>
+          <p:nvPr>
+            <p:ph type="body" idx="1"/>
+          </p:nvPr>
+        </p:nvSpPr>
+        <p:spPr/>
+        <p:txBody>
+          <a:bodyPr/>
+          <a:lstStyle/>
+          <a:p>
+            <a:endParaRPr lang="da-DK"/>
+          </a:p>
+        </p:txBody>
+      </p:sp>
+      <p:sp>
+        <p:nvSpPr>
+          <p:cNvPr id="4" name="Slide Number Placeholder 3"/>
+          <p:cNvSpPr>
+            <a:spLocks noGrp="1"/>
+          </p:cNvSpPr>
+          <p:nvPr>
+            <p:ph type="sldNum" sz="quarter" idx="10"/>
+          </p:nvPr>
+        </p:nvSpPr>
+        <p:spPr/>
+        <p:txBody>
+          <a:bodyPr/>
+          <a:lstStyle/>
+          <a:p>
+            <a:fld id="{3F7897CC-D6E9-4611-977B-4B8E9DF0D79A}" type="slidenum">
+              <a:rPr lang="da-DK" smtClean="0"/>
+              <a:t>1</a:t>
+            </a:fld>
+            <a:endParaRPr lang="da-DK"/>
+          </a:p>
+        </p:txBody>
+      </p:sp>
+    </p:spTree>
+    <p:extLst>
+      <p:ext uri="{BB962C8B-B14F-4D97-AF65-F5344CB8AC3E}">
+        <p14:creationId xmlns:p14="http://schemas.microsoft.com/office/powerpoint/2010/main" val="1121342168"/>
+      </p:ext>
+    </p:extLst>
+  </p:cSld>
+  <p:clrMapOvr>
+    <a:masterClrMapping/>
+  </p:clrMapOvr>
+</p:notes>
+</file>
+
+<file path=ppt/notesSlides/notesSlide2.xml><?xml version="1.0" encoding="utf-8"?>
+<p:notes xmlns:a="http://schemas.openxmlformats.org/drawingml/2006/main" xmlns:r="http://schemas.openxmlformats.org/officeDocument/2006/relationships" xmlns:p="http://schemas.openxmlformats.org/presentationml/2006/main">
+  <p:cSld>
+    <p:spTree>
+      <p:nvGrpSpPr>
+        <p:cNvPr id="1" name=""/>
+        <p:cNvGrpSpPr/>
+        <p:nvPr/>
+      </p:nvGrpSpPr>
+      <p:grpSpPr>
+        <a:xfrm>
+          <a:off x="0" y="0"/>
+          <a:ext cx="0" cy="0"/>
+          <a:chOff x="0" y="0"/>
+          <a:chExt cx="0" cy="0"/>
+        </a:xfrm>
+      </p:grpSpPr>
+      <p:sp>
+        <p:nvSpPr>
+          <p:cNvPr id="2" name="Slide Image Placeholder 1"/>
+          <p:cNvSpPr>
+            <a:spLocks noGrp="1" noRot="1" noChangeAspect="1"/>
+          </p:cNvSpPr>
+          <p:nvPr>
+            <p:ph type="sldImg"/>
+          </p:nvPr>
+        </p:nvSpPr>
+        <p:spPr/>
+      </p:sp>
+      <p:sp>
+        <p:nvSpPr>
+          <p:cNvPr id="3" name="Notes Placeholder 2"/>
+          <p:cNvSpPr>
+            <a:spLocks noGrp="1"/>
+          </p:cNvSpPr>
+          <p:nvPr>
+            <p:ph type="body" idx="1"/>
+          </p:nvPr>
+        </p:nvSpPr>
+        <p:spPr/>
+        <p:txBody>
+          <a:bodyPr/>
+          <a:lstStyle/>
+          <a:p>
+            <a:endParaRPr lang="da-DK"/>
+          </a:p>
+        </p:txBody>
+      </p:sp>
+      <p:sp>
+        <p:nvSpPr>
+          <p:cNvPr id="4" name="Slide Number Placeholder 3"/>
+          <p:cNvSpPr>
+            <a:spLocks noGrp="1"/>
+          </p:cNvSpPr>
+          <p:nvPr>
+            <p:ph type="sldNum" sz="quarter" idx="10"/>
+          </p:nvPr>
+        </p:nvSpPr>
+        <p:spPr/>
+        <p:txBody>
+          <a:bodyPr/>
+          <a:lstStyle/>
+          <a:p>
+            <a:fld id="{3F7897CC-D6E9-4611-977B-4B8E9DF0D79A}" type="slidenum">
+              <a:rPr lang="da-DK" smtClean="0"/>
+              <a:t>2</a:t>
+            </a:fld>
+            <a:endParaRPr lang="da-DK"/>
+          </a:p>
+        </p:txBody>
+      </p:sp>
+    </p:spTree>
+    <p:extLst>
+      <p:ext uri="{BB962C8B-B14F-4D97-AF65-F5344CB8AC3E}">
+        <p14:creationId xmlns:p14="http://schemas.microsoft.com/office/powerpoint/2010/main" val="177210212"/>
+      </p:ext>
+    </p:extLst>
+  </p:cSld>
+  <p:clrMapOvr>
+    <a:masterClrMapping/>
+  </p:clrMapOvr>
+</p:notes>
+</file>
+
+<file path=ppt/notesSlides/notesSlide3.xml><?xml version="1.0" encoding="utf-8"?>
+<p:notes xmlns:a="http://schemas.openxmlformats.org/drawingml/2006/main" xmlns:r="http://schemas.openxmlformats.org/officeDocument/2006/relationships" xmlns:p="http://schemas.openxmlformats.org/presentationml/2006/main">
+  <p:cSld>
+    <p:spTree>
+      <p:nvGrpSpPr>
+        <p:cNvPr id="1" name=""/>
+        <p:cNvGrpSpPr/>
+        <p:nvPr/>
+      </p:nvGrpSpPr>
+      <p:grpSpPr>
+        <a:xfrm>
+          <a:off x="0" y="0"/>
+          <a:ext cx="0" cy="0"/>
+          <a:chOff x="0" y="0"/>
+          <a:chExt cx="0" cy="0"/>
+        </a:xfrm>
+      </p:grpSpPr>
+      <p:sp>
+        <p:nvSpPr>
+          <p:cNvPr id="2" name="Slide Image Placeholder 1"/>
+          <p:cNvSpPr>
+            <a:spLocks noGrp="1" noRot="1" noChangeAspect="1"/>
+          </p:cNvSpPr>
+          <p:nvPr>
+            <p:ph type="sldImg"/>
+          </p:nvPr>
+        </p:nvSpPr>
+        <p:spPr/>
+      </p:sp>
+      <p:sp>
+        <p:nvSpPr>
+          <p:cNvPr id="3" name="Notes Placeholder 2"/>
+          <p:cNvSpPr>
+            <a:spLocks noGrp="1"/>
+          </p:cNvSpPr>
+          <p:nvPr>
+            <p:ph type="body" idx="1"/>
+          </p:nvPr>
+        </p:nvSpPr>
+        <p:spPr/>
+        <p:txBody>
+          <a:bodyPr/>
+          <a:lstStyle/>
+          <a:p>
+            <a:endParaRPr lang="da-DK"/>
+          </a:p>
+        </p:txBody>
+      </p:sp>
+      <p:sp>
+        <p:nvSpPr>
+          <p:cNvPr id="4" name="Slide Number Placeholder 3"/>
+          <p:cNvSpPr>
+            <a:spLocks noGrp="1"/>
+          </p:cNvSpPr>
+          <p:nvPr>
+            <p:ph type="sldNum" sz="quarter" idx="10"/>
+          </p:nvPr>
+        </p:nvSpPr>
+        <p:spPr/>
+        <p:txBody>
+          <a:bodyPr/>
+          <a:lstStyle/>
+          <a:p>
+            <a:fld id="{3F7897CC-D6E9-4611-977B-4B8E9DF0D79A}" type="slidenum">
+              <a:rPr lang="da-DK" smtClean="0"/>
+              <a:t>3</a:t>
+            </a:fld>
+            <a:endParaRPr lang="da-DK"/>
+          </a:p>
+        </p:txBody>
+      </p:sp>
+    </p:spTree>
+    <p:extLst>
+      <p:ext uri="{BB962C8B-B14F-4D97-AF65-F5344CB8AC3E}">
+        <p14:creationId xmlns:p14="http://schemas.microsoft.com/office/powerpoint/2010/main" val="559270967"/>
+      </p:ext>
+    </p:extLst>
+  </p:cSld>
+  <p:clrMapOvr>
+    <a:masterClrMapping/>
+  </p:clrMapOvr>
+</p:notes>
+</file>
+
+<file path=ppt/notesSlides/notesSlide4.xml><?xml version="1.0" encoding="utf-8"?>
+<p:notes xmlns:a="http://schemas.openxmlformats.org/drawingml/2006/main" xmlns:r="http://schemas.openxmlformats.org/officeDocument/2006/relationships" xmlns:p="http://schemas.openxmlformats.org/presentationml/2006/main">
+  <p:cSld>
+    <p:spTree>
+      <p:nvGrpSpPr>
+        <p:cNvPr id="1" name=""/>
+        <p:cNvGrpSpPr/>
+        <p:nvPr/>
+      </p:nvGrpSpPr>
+      <p:grpSpPr>
+        <a:xfrm>
+          <a:off x="0" y="0"/>
+          <a:ext cx="0" cy="0"/>
+          <a:chOff x="0" y="0"/>
+          <a:chExt cx="0" cy="0"/>
+        </a:xfrm>
+      </p:grpSpPr>
+      <p:sp>
+        <p:nvSpPr>
+          <p:cNvPr id="2" name="Slide Image Placeholder 1"/>
+          <p:cNvSpPr>
+            <a:spLocks noGrp="1" noRot="1" noChangeAspect="1"/>
+          </p:cNvSpPr>
+          <p:nvPr>
+            <p:ph type="sldImg"/>
+          </p:nvPr>
+        </p:nvSpPr>
+        <p:spPr/>
+      </p:sp>
+      <p:sp>
+        <p:nvSpPr>
+          <p:cNvPr id="3" name="Notes Placeholder 2"/>
+          <p:cNvSpPr>
+            <a:spLocks noGrp="1"/>
+          </p:cNvSpPr>
+          <p:nvPr>
+            <p:ph type="body" idx="1"/>
+          </p:nvPr>
+        </p:nvSpPr>
+        <p:spPr/>
+        <p:txBody>
+          <a:bodyPr/>
+          <a:lstStyle/>
+          <a:p>
+            <a:endParaRPr lang="da-DK"/>
+          </a:p>
+        </p:txBody>
+      </p:sp>
+      <p:sp>
+        <p:nvSpPr>
+          <p:cNvPr id="4" name="Slide Number Placeholder 3"/>
+          <p:cNvSpPr>
+            <a:spLocks noGrp="1"/>
+          </p:cNvSpPr>
+          <p:nvPr>
+            <p:ph type="sldNum" sz="quarter" idx="10"/>
+          </p:nvPr>
+        </p:nvSpPr>
+        <p:spPr/>
+        <p:txBody>
+          <a:bodyPr/>
+          <a:lstStyle/>
+          <a:p>
+            <a:fld id="{3F7897CC-D6E9-4611-977B-4B8E9DF0D79A}" type="slidenum">
+              <a:rPr lang="da-DK" smtClean="0"/>
+              <a:t>4</a:t>
+            </a:fld>
+            <a:endParaRPr lang="da-DK"/>
+          </a:p>
+        </p:txBody>
+      </p:sp>
+    </p:spTree>
+    <p:extLst>
+      <p:ext uri="{BB962C8B-B14F-4D97-AF65-F5344CB8AC3E}">
+        <p14:creationId xmlns:p14="http://schemas.microsoft.com/office/powerpoint/2010/main" val="1744653752"/>
+      </p:ext>
+    </p:extLst>
+  </p:cSld>
+  <p:clrMapOvr>
+    <a:masterClrMapping/>
+  </p:clrMapOvr>
+</p:notes>
+</file>
+
+<file path=ppt/notesSlides/notesSlide5.xml><?xml version="1.0" encoding="utf-8"?>
+<p:notes xmlns:a="http://schemas.openxmlformats.org/drawingml/2006/main" xmlns:r="http://schemas.openxmlformats.org/officeDocument/2006/relationships" xmlns:p="http://schemas.openxmlformats.org/presentationml/2006/main">
+  <p:cSld>
+    <p:spTree>
+      <p:nvGrpSpPr>
+        <p:cNvPr id="1" name=""/>
+        <p:cNvGrpSpPr/>
+        <p:nvPr/>
+      </p:nvGrpSpPr>
+      <p:grpSpPr>
+        <a:xfrm>
+          <a:off x="0" y="0"/>
+          <a:ext cx="0" cy="0"/>
+          <a:chOff x="0" y="0"/>
+          <a:chExt cx="0" cy="0"/>
+        </a:xfrm>
+      </p:grpSpPr>
+      <p:sp>
+        <p:nvSpPr>
+          <p:cNvPr id="2" name="Slide Image Placeholder 1"/>
+          <p:cNvSpPr>
+            <a:spLocks noGrp="1" noRot="1" noChangeAspect="1"/>
+          </p:cNvSpPr>
+          <p:nvPr>
+            <p:ph type="sldImg"/>
+          </p:nvPr>
+        </p:nvSpPr>
+        <p:spPr/>
+      </p:sp>
+      <p:sp>
+        <p:nvSpPr>
+          <p:cNvPr id="3" name="Notes Placeholder 2"/>
+          <p:cNvSpPr>
+            <a:spLocks noGrp="1"/>
+          </p:cNvSpPr>
+          <p:nvPr>
+            <p:ph type="body" idx="1"/>
+          </p:nvPr>
+        </p:nvSpPr>
+        <p:spPr/>
+        <p:txBody>
+          <a:bodyPr/>
+          <a:lstStyle/>
+          <a:p>
+            <a:endParaRPr lang="da-DK"/>
+          </a:p>
+        </p:txBody>
+      </p:sp>
+      <p:sp>
+        <p:nvSpPr>
+          <p:cNvPr id="4" name="Slide Number Placeholder 3"/>
+          <p:cNvSpPr>
+            <a:spLocks noGrp="1"/>
+          </p:cNvSpPr>
+          <p:nvPr>
+            <p:ph type="sldNum" sz="quarter" idx="10"/>
+          </p:nvPr>
+        </p:nvSpPr>
+        <p:spPr/>
+        <p:txBody>
+          <a:bodyPr/>
+          <a:lstStyle/>
+          <a:p>
+            <a:fld id="{3F7897CC-D6E9-4611-977B-4B8E9DF0D79A}" type="slidenum">
+              <a:rPr lang="da-DK" smtClean="0"/>
+              <a:t>5</a:t>
+            </a:fld>
+            <a:endParaRPr lang="da-DK"/>
+          </a:p>
+        </p:txBody>
+      </p:sp>
+    </p:spTree>
+    <p:extLst>
+      <p:ext uri="{BB962C8B-B14F-4D97-AF65-F5344CB8AC3E}">
+        <p14:creationId xmlns:p14="http://schemas.microsoft.com/office/powerpoint/2010/main" val="533067863"/>
+      </p:ext>
+    </p:extLst>
+  </p:cSld>
+  <p:clrMapOvr>
+    <a:masterClrMapping/>
+  </p:clrMapOvr>
+</p:notes>
+</file>
+
+<file path=ppt/notesSlides/notesSlide6.xml><?xml version="1.0" encoding="utf-8"?>
+<p:notes xmlns:a="http://schemas.openxmlformats.org/drawingml/2006/main" xmlns:r="http://schemas.openxmlformats.org/officeDocument/2006/relationships" xmlns:p="http://schemas.openxmlformats.org/presentationml/2006/main">
+  <p:cSld>
+    <p:spTree>
+      <p:nvGrpSpPr>
+        <p:cNvPr id="1" name=""/>
+        <p:cNvGrpSpPr/>
+        <p:nvPr/>
+      </p:nvGrpSpPr>
+      <p:grpSpPr>
+        <a:xfrm>
+          <a:off x="0" y="0"/>
+          <a:ext cx="0" cy="0"/>
+          <a:chOff x="0" y="0"/>
+          <a:chExt cx="0" cy="0"/>
+        </a:xfrm>
+      </p:grpSpPr>
+      <p:sp>
+        <p:nvSpPr>
+          <p:cNvPr id="2" name="Slide Image Placeholder 1"/>
+          <p:cNvSpPr>
+            <a:spLocks noGrp="1" noRot="1" noChangeAspect="1"/>
+          </p:cNvSpPr>
+          <p:nvPr>
+            <p:ph type="sldImg"/>
+          </p:nvPr>
+        </p:nvSpPr>
+        <p:spPr/>
+      </p:sp>
+      <p:sp>
+        <p:nvSpPr>
+          <p:cNvPr id="3" name="Notes Placeholder 2"/>
+          <p:cNvSpPr>
+            <a:spLocks noGrp="1"/>
+          </p:cNvSpPr>
+          <p:nvPr>
+            <p:ph type="body" idx="1"/>
+          </p:nvPr>
+        </p:nvSpPr>
+        <p:spPr/>
+        <p:txBody>
+          <a:bodyPr/>
+          <a:lstStyle/>
+          <a:p>
+            <a:endParaRPr lang="da-DK"/>
+          </a:p>
+        </p:txBody>
+      </p:sp>
+      <p:sp>
+        <p:nvSpPr>
+          <p:cNvPr id="4" name="Slide Number Placeholder 3"/>
+          <p:cNvSpPr>
+            <a:spLocks noGrp="1"/>
+          </p:cNvSpPr>
+          <p:nvPr>
+            <p:ph type="sldNum" sz="quarter" idx="10"/>
+          </p:nvPr>
+        </p:nvSpPr>
+        <p:spPr/>
+        <p:txBody>
+          <a:bodyPr/>
+          <a:lstStyle/>
+          <a:p>
+            <a:fld id="{3F7897CC-D6E9-4611-977B-4B8E9DF0D79A}" type="slidenum">
+              <a:rPr lang="da-DK" smtClean="0"/>
+              <a:t>6</a:t>
+            </a:fld>
+            <a:endParaRPr lang="da-DK"/>
+          </a:p>
+        </p:txBody>
+      </p:sp>
+    </p:spTree>
+    <p:extLst>
+      <p:ext uri="{BB962C8B-B14F-4D97-AF65-F5344CB8AC3E}">
+        <p14:creationId xmlns:p14="http://schemas.microsoft.com/office/powerpoint/2010/main" val="1743461605"/>
+      </p:ext>
+    </p:extLst>
+  </p:cSld>
+  <p:clrMapOvr>
+    <a:masterClrMapping/>
+  </p:clrMapOvr>
+</p:notes>
 </file>
 
 <file path=ppt/slideLayouts/slideLayout1.xml><?xml version="1.0" encoding="utf-8"?>
@@ -8910,7 +9767,7 @@
           <a:p>
             <a:fld id="{6AD6EE87-EBD5-4F12-A48A-63ACA297AC8F}" type="datetimeFigureOut">
               <a:rPr lang="en-US" dirty="0"/>
-              <a:t>5/11/2017</a:t>
+              <a:t>5/12/2017</a:t>
             </a:fld>
             <a:endParaRPr lang="en-US" dirty="0"/>
           </a:p>
@@ -8952,7 +9809,7 @@
           <a:p>
             <a:fld id="{4FAB73BC-B049-4115-A692-8D63A059BFB8}" type="slidenum">
               <a:rPr lang="en-US" dirty="0"/>
-              <a:t>‹nr.›</a:t>
+              <a:t>‹#›</a:t>
             </a:fld>
             <a:endParaRPr lang="en-US" dirty="0"/>
           </a:p>
@@ -9112,7 +9969,7 @@
           <a:p>
             <a:fld id="{4CD73815-2707-4475-8F1A-B873CB631BB4}" type="datetimeFigureOut">
               <a:rPr lang="en-US" dirty="0"/>
-              <a:t>5/11/2017</a:t>
+              <a:t>5/12/2017</a:t>
             </a:fld>
             <a:endParaRPr lang="en-US" dirty="0"/>
           </a:p>
@@ -9154,7 +10011,7 @@
           <a:p>
             <a:fld id="{4FAB73BC-B049-4115-A692-8D63A059BFB8}" type="slidenum">
               <a:rPr lang="en-US" dirty="0"/>
-              <a:t>‹nr.›</a:t>
+              <a:t>‹#›</a:t>
             </a:fld>
             <a:endParaRPr lang="en-US" dirty="0"/>
           </a:p>
@@ -9287,7 +10144,7 @@
           <a:p>
             <a:fld id="{2A4AFB99-0EAB-4182-AFF8-E214C82A68F6}" type="datetimeFigureOut">
               <a:rPr lang="en-US" dirty="0"/>
-              <a:t>5/11/2017</a:t>
+              <a:t>5/12/2017</a:t>
             </a:fld>
             <a:endParaRPr lang="en-US" dirty="0"/>
           </a:p>
@@ -9329,7 +10186,7 @@
           <a:p>
             <a:fld id="{4FAB73BC-B049-4115-A692-8D63A059BFB8}" type="slidenum">
               <a:rPr lang="en-US" dirty="0"/>
-              <a:t>‹nr.›</a:t>
+              <a:t>‹#›</a:t>
             </a:fld>
             <a:endParaRPr lang="en-US" dirty="0"/>
           </a:p>
@@ -9487,7 +10344,7 @@
           <a:p>
             <a:fld id="{A5D3794B-289A-4A80-97D7-111025398D45}" type="datetimeFigureOut">
               <a:rPr lang="en-US" dirty="0"/>
-              <a:t>5/11/2017</a:t>
+              <a:t>5/12/2017</a:t>
             </a:fld>
             <a:endParaRPr lang="en-US" dirty="0"/>
           </a:p>
@@ -9529,7 +10386,7 @@
           <a:p>
             <a:fld id="{4FAB73BC-B049-4115-A692-8D63A059BFB8}" type="slidenum">
               <a:rPr lang="en-US" dirty="0"/>
-              <a:t>‹nr.›</a:t>
+              <a:t>‹#›</a:t>
             </a:fld>
             <a:endParaRPr lang="en-US" dirty="0"/>
           </a:p>
@@ -18380,7 +19237,7 @@
           <a:p>
             <a:fld id="{5A61015F-7CC6-4D0A-9D87-873EA4C304CC}" type="datetimeFigureOut">
               <a:rPr lang="en-US" dirty="0"/>
-              <a:t>5/11/2017</a:t>
+              <a:t>5/12/2017</a:t>
             </a:fld>
             <a:endParaRPr lang="en-US" dirty="0"/>
           </a:p>
@@ -18422,7 +19279,7 @@
           <a:p>
             <a:fld id="{4FAB73BC-B049-4115-A692-8D63A059BFB8}" type="slidenum">
               <a:rPr lang="en-US" dirty="0"/>
-              <a:t>‹nr.›</a:t>
+              <a:t>‹#›</a:t>
             </a:fld>
             <a:endParaRPr lang="en-US" dirty="0"/>
           </a:p>
@@ -18649,7 +19506,7 @@
           <a:p>
             <a:fld id="{93C6A301-0538-44EC-B09D-202E1042A48B}" type="datetimeFigureOut">
               <a:rPr lang="en-US" dirty="0"/>
-              <a:t>5/11/2017</a:t>
+              <a:t>5/12/2017</a:t>
             </a:fld>
             <a:endParaRPr lang="en-US" dirty="0"/>
           </a:p>
@@ -18691,7 +19548,7 @@
           <a:p>
             <a:fld id="{4FAB73BC-B049-4115-A692-8D63A059BFB8}" type="slidenum">
               <a:rPr lang="en-US" dirty="0"/>
-              <a:t>‹nr.›</a:t>
+              <a:t>‹#›</a:t>
             </a:fld>
             <a:endParaRPr lang="en-US" dirty="0"/>
           </a:p>
@@ -19042,7 +19899,7 @@
           <a:p>
             <a:fld id="{D789574A-8875-45EF-8EA2-3CAA0F7ABC4C}" type="datetimeFigureOut">
               <a:rPr lang="en-US" dirty="0"/>
-              <a:t>5/11/2017</a:t>
+              <a:t>5/12/2017</a:t>
             </a:fld>
             <a:endParaRPr lang="en-US" dirty="0"/>
           </a:p>
@@ -19084,7 +19941,7 @@
           <a:p>
             <a:fld id="{4FAB73BC-B049-4115-A692-8D63A059BFB8}" type="slidenum">
               <a:rPr lang="en-US" dirty="0"/>
-              <a:t>‹nr.›</a:t>
+              <a:t>‹#›</a:t>
             </a:fld>
             <a:endParaRPr lang="en-US" dirty="0"/>
           </a:p>
@@ -19155,7 +20012,7 @@
           <a:p>
             <a:fld id="{67EF4D4C-5367-4C26-9E2B-D8088D7FCA81}" type="datetimeFigureOut">
               <a:rPr lang="en-US" dirty="0"/>
-              <a:t>5/11/2017</a:t>
+              <a:t>5/12/2017</a:t>
             </a:fld>
             <a:endParaRPr lang="en-US" dirty="0"/>
           </a:p>
@@ -19197,7 +20054,7 @@
           <a:p>
             <a:fld id="{4FAB73BC-B049-4115-A692-8D63A059BFB8}" type="slidenum">
               <a:rPr lang="en-US" dirty="0"/>
-              <a:t>‹nr.›</a:t>
+              <a:t>‹#›</a:t>
             </a:fld>
             <a:endParaRPr lang="en-US" dirty="0"/>
           </a:p>
@@ -19245,7 +20102,7 @@
           <a:p>
             <a:fld id="{56E91E96-98B0-4413-9547-46F3504108EF}" type="datetimeFigureOut">
               <a:rPr lang="en-US" dirty="0"/>
-              <a:t>5/11/2017</a:t>
+              <a:t>5/12/2017</a:t>
             </a:fld>
             <a:endParaRPr lang="en-US" dirty="0"/>
           </a:p>
@@ -19287,7 +20144,7 @@
           <a:p>
             <a:fld id="{4FAB73BC-B049-4115-A692-8D63A059BFB8}" type="slidenum">
               <a:rPr lang="en-US" dirty="0"/>
-              <a:t>‹nr.›</a:t>
+              <a:t>‹#›</a:t>
             </a:fld>
             <a:endParaRPr lang="en-US" dirty="0"/>
           </a:p>
@@ -19530,7 +20387,7 @@
           <a:p>
             <a:fld id="{05C68B11-C5A8-448C-8CE9-B1A273C79CFC}" type="datetimeFigureOut">
               <a:rPr lang="en-US" dirty="0"/>
-              <a:t>5/11/2017</a:t>
+              <a:t>5/12/2017</a:t>
             </a:fld>
             <a:endParaRPr lang="en-US" dirty="0"/>
           </a:p>
@@ -19572,7 +20429,7 @@
           <a:p>
             <a:fld id="{4FAB73BC-B049-4115-A692-8D63A059BFB8}" type="slidenum">
               <a:rPr lang="en-US" dirty="0"/>
-              <a:t>‹nr.›</a:t>
+              <a:t>‹#›</a:t>
             </a:fld>
             <a:endParaRPr lang="en-US" dirty="0"/>
           </a:p>
@@ -19805,7 +20662,7 @@
           <a:p>
             <a:fld id="{C7616CA0-919D-4A49-9C8A-62FDFB3A5183}" type="datetimeFigureOut">
               <a:rPr lang="en-US" dirty="0"/>
-              <a:t>5/11/2017</a:t>
+              <a:t>5/12/2017</a:t>
             </a:fld>
             <a:endParaRPr lang="en-US" dirty="0"/>
           </a:p>
@@ -19847,7 +20704,7 @@
           <a:p>
             <a:fld id="{867E5644-1E61-4311-A31E-84CB9C7AA8A9}" type="slidenum">
               <a:rPr lang="en-US" dirty="0"/>
-              <a:t>‹nr.›</a:t>
+              <a:t>‹#›</a:t>
             </a:fld>
             <a:endParaRPr lang="en-US" dirty="0"/>
           </a:p>
@@ -20051,7 +20908,7 @@
             <a:fld id="{90298CD5-6C1E-4009-B41F-6DF62E31D3BE}" type="datetimeFigureOut">
               <a:rPr lang="en-US" dirty="0"/>
               <a:pPr/>
-              <a:t>5/11/2017</a:t>
+              <a:t>5/12/2017</a:t>
             </a:fld>
             <a:endParaRPr lang="en-US" dirty="0"/>
           </a:p>
@@ -20134,7 +20991,7 @@
             <a:fld id="{4FAB73BC-B049-4115-A692-8D63A059BFB8}" type="slidenum">
               <a:rPr lang="en-US" dirty="0"/>
               <a:pPr/>
-              <a:t>‹nr.›</a:t>
+              <a:t>‹#›</a:t>
             </a:fld>
             <a:endParaRPr lang="en-US" dirty="0"/>
           </a:p>
@@ -21134,7 +21991,7 @@
           </p:nvPr>
         </p:nvPicPr>
         <p:blipFill>
-          <a:blip r:embed="rId2">
+          <a:blip r:embed="rId3">
             <a:extLst>
               <a:ext uri="{28A0092B-C50C-407E-A947-70E740481C1C}">
                 <a14:useLocalDpi xmlns:a14="http://schemas.microsoft.com/office/drawing/2010/main" val="0"/>
@@ -21221,7 +22078,7 @@
           <p:nvPr/>
         </p:nvPicPr>
         <p:blipFill>
-          <a:blip r:embed="rId2"/>
+          <a:blip r:embed="rId3"/>
           <a:stretch>
             <a:fillRect/>
           </a:stretch>
@@ -21290,7 +22147,11 @@
           <a:p>
             <a:r>
               <a:rPr lang="en-GB" dirty="0" err="1" smtClean="0"/>
-              <a:t>Struktur</a:t>
+              <a:t>Sammenligning</a:t>
+            </a:r>
+            <a:r>
+              <a:rPr lang="en-GB" dirty="0" smtClean="0"/>
+              <a:t> med strategy</a:t>
             </a:r>
             <a:endParaRPr lang="en-GB" dirty="0"/>
           </a:p>
@@ -21331,28 +22192,86 @@
           </a:p>
         </p:txBody>
       </p:sp>
-      <p:pic>
-        <p:nvPicPr>
-          <p:cNvPr id="4" name="Billede 3"/>
-          <p:cNvPicPr/>
+      <p:grpSp>
+        <p:nvGrpSpPr>
+          <p:cNvPr id="5" name="Group 4"/>
+          <p:cNvGrpSpPr/>
           <p:nvPr/>
-        </p:nvPicPr>
-        <p:blipFill>
-          <a:blip r:embed="rId2"/>
-          <a:stretch>
-            <a:fillRect/>
-          </a:stretch>
-        </p:blipFill>
-        <p:spPr>
+        </p:nvGrpSpPr>
+        <p:grpSpPr>
           <a:xfrm>
-            <a:off x="2393482" y="3048993"/>
-            <a:ext cx="6923045" cy="2980870"/>
+            <a:off x="1024128" y="1561935"/>
+            <a:ext cx="11052437" cy="5296065"/>
+            <a:chOff x="0" y="0"/>
+            <a:chExt cx="6937375" cy="3324225"/>
           </a:xfrm>
-          <a:prstGeom prst="rect">
-            <a:avLst/>
-          </a:prstGeom>
-        </p:spPr>
-      </p:pic>
+        </p:grpSpPr>
+        <p:pic>
+          <p:nvPicPr>
+            <p:cNvPr id="6" name="Picture 5" descr="generic decorator pattern"/>
+            <p:cNvPicPr>
+              <a:picLocks noChangeAspect="1"/>
+            </p:cNvPicPr>
+            <p:nvPr/>
+          </p:nvPicPr>
+          <p:blipFill>
+            <a:blip r:embed="rId3">
+              <a:extLst>
+                <a:ext uri="{28A0092B-C50C-407E-A947-70E740481C1C}">
+                  <a14:useLocalDpi xmlns:a14="http://schemas.microsoft.com/office/drawing/2010/main" val="0"/>
+                </a:ext>
+              </a:extLst>
+            </a:blip>
+            <a:srcRect/>
+            <a:stretch>
+              <a:fillRect/>
+            </a:stretch>
+          </p:blipFill>
+          <p:spPr bwMode="auto">
+            <a:xfrm>
+              <a:off x="3552825" y="0"/>
+              <a:ext cx="3384550" cy="3324225"/>
+            </a:xfrm>
+            <a:prstGeom prst="rect">
+              <a:avLst/>
+            </a:prstGeom>
+            <a:noFill/>
+            <a:ln>
+              <a:noFill/>
+            </a:ln>
+          </p:spPr>
+        </p:pic>
+        <p:pic>
+          <p:nvPicPr>
+            <p:cNvPr id="7" name="Picture 6"/>
+            <p:cNvPicPr>
+              <a:picLocks noChangeAspect="1"/>
+            </p:cNvPicPr>
+            <p:nvPr/>
+          </p:nvPicPr>
+          <p:blipFill>
+            <a:blip r:embed="rId4">
+              <a:extLst>
+                <a:ext uri="{28A0092B-C50C-407E-A947-70E740481C1C}">
+                  <a14:useLocalDpi xmlns:a14="http://schemas.microsoft.com/office/drawing/2010/main" val="0"/>
+                </a:ext>
+              </a:extLst>
+            </a:blip>
+            <a:stretch>
+              <a:fillRect/>
+            </a:stretch>
+          </p:blipFill>
+          <p:spPr>
+            <a:xfrm>
+              <a:off x="0" y="276225"/>
+              <a:ext cx="3607435" cy="2124075"/>
+            </a:xfrm>
+            <a:prstGeom prst="rect">
+              <a:avLst/>
+            </a:prstGeom>
+          </p:spPr>
+        </p:pic>
+      </p:grpSp>
     </p:spTree>
     <p:extLst>
       <p:ext uri="{BB962C8B-B14F-4D97-AF65-F5344CB8AC3E}">
@@ -21433,8 +22352,27 @@
               <a:buChar char="•"/>
             </a:pPr>
             <a:r>
+              <a:rPr lang="en-GB" dirty="0" err="1" smtClean="0"/>
+              <a:t>Udvide</a:t>
+            </a:r>
+            <a:endParaRPr lang="en-GB" dirty="0"/>
+          </a:p>
+          <a:p>
+            <a:pPr>
+              <a:buFont typeface="Arial" panose="020B0604020202020204" pitchFamily="34" charset="0"/>
+              <a:buChar char="•"/>
+            </a:pPr>
+            <a:r>
               <a:rPr lang="en-GB" dirty="0" smtClean="0"/>
-              <a:t> Open Closed principle</a:t>
+              <a:t>Decorator VS </a:t>
+            </a:r>
+            <a:r>
+              <a:rPr lang="en-GB" dirty="0" err="1" smtClean="0"/>
+              <a:t>nedarvning</a:t>
+            </a:r>
+            <a:r>
+              <a:rPr lang="en-GB" dirty="0" smtClean="0"/>
+              <a:t> VS strategy</a:t>
             </a:r>
           </a:p>
           <a:p>
@@ -21444,9 +22382,17 @@
             </a:pPr>
             <a:r>
               <a:rPr lang="en-GB" dirty="0" smtClean="0"/>
-              <a:t> </a:t>
+              <a:t>Open </a:t>
             </a:r>
-            <a:endParaRPr lang="en-GB" dirty="0"/>
+            <a:r>
+              <a:rPr lang="en-GB" dirty="0" smtClean="0"/>
+              <a:t>Closed </a:t>
+            </a:r>
+            <a:r>
+              <a:rPr lang="en-GB" dirty="0" smtClean="0"/>
+              <a:t>principle</a:t>
+            </a:r>
+            <a:endParaRPr lang="en-GB" dirty="0" smtClean="0"/>
           </a:p>
         </p:txBody>
       </p:sp>
@@ -21738,13 +22684,268 @@
 </a:theme>
 </file>
 
-<file path=customXml/item1.xml><?xml version="1.0" encoding="utf-8"?>
-<Control xmlns="http://schemas.microsoft.com/VisualStudio/2011/storyboarding/control">
-  <Id Name="System.Storyboarding.Common.DragSelection" Revision="1" Stencil="System.Storyboarding.Common" StencilVersion="0.1"/>
-</Control>
+<file path=ppt/theme/theme2.xml><?xml version="1.0" encoding="utf-8"?>
+<a:theme xmlns:a="http://schemas.openxmlformats.org/drawingml/2006/main" name="Office Theme">
+  <a:themeElements>
+    <a:clrScheme name="Office">
+      <a:dk1>
+        <a:sysClr val="windowText" lastClr="000000"/>
+      </a:dk1>
+      <a:lt1>
+        <a:sysClr val="window" lastClr="FFFFFF"/>
+      </a:lt1>
+      <a:dk2>
+        <a:srgbClr val="44546A"/>
+      </a:dk2>
+      <a:lt2>
+        <a:srgbClr val="E7E6E6"/>
+      </a:lt2>
+      <a:accent1>
+        <a:srgbClr val="5B9BD5"/>
+      </a:accent1>
+      <a:accent2>
+        <a:srgbClr val="ED7D31"/>
+      </a:accent2>
+      <a:accent3>
+        <a:srgbClr val="A5A5A5"/>
+      </a:accent3>
+      <a:accent4>
+        <a:srgbClr val="FFC000"/>
+      </a:accent4>
+      <a:accent5>
+        <a:srgbClr val="4472C4"/>
+      </a:accent5>
+      <a:accent6>
+        <a:srgbClr val="70AD47"/>
+      </a:accent6>
+      <a:hlink>
+        <a:srgbClr val="0563C1"/>
+      </a:hlink>
+      <a:folHlink>
+        <a:srgbClr val="954F72"/>
+      </a:folHlink>
+    </a:clrScheme>
+    <a:fontScheme name="Office">
+      <a:majorFont>
+        <a:latin typeface="Calibri Light" panose="020F0302020204030204"/>
+        <a:ea typeface=""/>
+        <a:cs typeface=""/>
+        <a:font script="Jpan" typeface="ＭＳ Ｐゴシック"/>
+        <a:font script="Hang" typeface="맑은 고딕"/>
+        <a:font script="Hans" typeface="宋体"/>
+        <a:font script="Hant" typeface="新細明體"/>
+        <a:font script="Arab" typeface="Times New Roman"/>
+        <a:font script="Hebr" typeface="Times New Roman"/>
+        <a:font script="Thai" typeface="Angsana New"/>
+        <a:font script="Ethi" typeface="Nyala"/>
+        <a:font script="Beng" typeface="Vrinda"/>
+        <a:font script="Gujr" typeface="Shruti"/>
+        <a:font script="Khmr" typeface="MoolBoran"/>
+        <a:font script="Knda" typeface="Tunga"/>
+        <a:font script="Guru" typeface="Raavi"/>
+        <a:font script="Cans" typeface="Euphemia"/>
+        <a:font script="Cher" typeface="Plantagenet Cherokee"/>
+        <a:font script="Yiii" typeface="Microsoft Yi Baiti"/>
+        <a:font script="Tibt" typeface="Microsoft Himalaya"/>
+        <a:font script="Thaa" typeface="MV Boli"/>
+        <a:font script="Deva" typeface="Mangal"/>
+        <a:font script="Telu" typeface="Gautami"/>
+        <a:font script="Taml" typeface="Latha"/>
+        <a:font script="Syrc" typeface="Estrangelo Edessa"/>
+        <a:font script="Orya" typeface="Kalinga"/>
+        <a:font script="Mlym" typeface="Kartika"/>
+        <a:font script="Laoo" typeface="DokChampa"/>
+        <a:font script="Sinh" typeface="Iskoola Pota"/>
+        <a:font script="Mong" typeface="Mongolian Baiti"/>
+        <a:font script="Viet" typeface="Times New Roman"/>
+        <a:font script="Uigh" typeface="Microsoft Uighur"/>
+        <a:font script="Geor" typeface="Sylfaen"/>
+      </a:majorFont>
+      <a:minorFont>
+        <a:latin typeface="Calibri" panose="020F0502020204030204"/>
+        <a:ea typeface=""/>
+        <a:cs typeface=""/>
+        <a:font script="Jpan" typeface="ＭＳ Ｐゴシック"/>
+        <a:font script="Hang" typeface="맑은 고딕"/>
+        <a:font script="Hans" typeface="宋体"/>
+        <a:font script="Hant" typeface="新細明體"/>
+        <a:font script="Arab" typeface="Arial"/>
+        <a:font script="Hebr" typeface="Arial"/>
+        <a:font script="Thai" typeface="Cordia New"/>
+        <a:font script="Ethi" typeface="Nyala"/>
+        <a:font script="Beng" typeface="Vrinda"/>
+        <a:font script="Gujr" typeface="Shruti"/>
+        <a:font script="Khmr" typeface="DaunPenh"/>
+        <a:font script="Knda" typeface="Tunga"/>
+        <a:font script="Guru" typeface="Raavi"/>
+        <a:font script="Cans" typeface="Euphemia"/>
+        <a:font script="Cher" typeface="Plantagenet Cherokee"/>
+        <a:font script="Yiii" typeface="Microsoft Yi Baiti"/>
+        <a:font script="Tibt" typeface="Microsoft Himalaya"/>
+        <a:font script="Thaa" typeface="MV Boli"/>
+        <a:font script="Deva" typeface="Mangal"/>
+        <a:font script="Telu" typeface="Gautami"/>
+        <a:font script="Taml" typeface="Latha"/>
+        <a:font script="Syrc" typeface="Estrangelo Edessa"/>
+        <a:font script="Orya" typeface="Kalinga"/>
+        <a:font script="Mlym" typeface="Kartika"/>
+        <a:font script="Laoo" typeface="DokChampa"/>
+        <a:font script="Sinh" typeface="Iskoola Pota"/>
+        <a:font script="Mong" typeface="Mongolian Baiti"/>
+        <a:font script="Viet" typeface="Arial"/>
+        <a:font script="Uigh" typeface="Microsoft Uighur"/>
+        <a:font script="Geor" typeface="Sylfaen"/>
+      </a:minorFont>
+    </a:fontScheme>
+    <a:fmtScheme name="Office">
+      <a:fillStyleLst>
+        <a:solidFill>
+          <a:schemeClr val="phClr"/>
+        </a:solidFill>
+        <a:gradFill rotWithShape="1">
+          <a:gsLst>
+            <a:gs pos="0">
+              <a:schemeClr val="phClr">
+                <a:lumMod val="110000"/>
+                <a:satMod val="105000"/>
+                <a:tint val="67000"/>
+              </a:schemeClr>
+            </a:gs>
+            <a:gs pos="50000">
+              <a:schemeClr val="phClr">
+                <a:lumMod val="105000"/>
+                <a:satMod val="103000"/>
+                <a:tint val="73000"/>
+              </a:schemeClr>
+            </a:gs>
+            <a:gs pos="100000">
+              <a:schemeClr val="phClr">
+                <a:lumMod val="105000"/>
+                <a:satMod val="109000"/>
+                <a:tint val="81000"/>
+              </a:schemeClr>
+            </a:gs>
+          </a:gsLst>
+          <a:lin ang="5400000" scaled="0"/>
+        </a:gradFill>
+        <a:gradFill rotWithShape="1">
+          <a:gsLst>
+            <a:gs pos="0">
+              <a:schemeClr val="phClr">
+                <a:satMod val="103000"/>
+                <a:lumMod val="102000"/>
+                <a:tint val="94000"/>
+              </a:schemeClr>
+            </a:gs>
+            <a:gs pos="50000">
+              <a:schemeClr val="phClr">
+                <a:satMod val="110000"/>
+                <a:lumMod val="100000"/>
+                <a:shade val="100000"/>
+              </a:schemeClr>
+            </a:gs>
+            <a:gs pos="100000">
+              <a:schemeClr val="phClr">
+                <a:lumMod val="99000"/>
+                <a:satMod val="120000"/>
+                <a:shade val="78000"/>
+              </a:schemeClr>
+            </a:gs>
+          </a:gsLst>
+          <a:lin ang="5400000" scaled="0"/>
+        </a:gradFill>
+      </a:fillStyleLst>
+      <a:lnStyleLst>
+        <a:ln w="6350" cap="flat" cmpd="sng" algn="ctr">
+          <a:solidFill>
+            <a:schemeClr val="phClr"/>
+          </a:solidFill>
+          <a:prstDash val="solid"/>
+          <a:miter lim="800000"/>
+        </a:ln>
+        <a:ln w="12700" cap="flat" cmpd="sng" algn="ctr">
+          <a:solidFill>
+            <a:schemeClr val="phClr"/>
+          </a:solidFill>
+          <a:prstDash val="solid"/>
+          <a:miter lim="800000"/>
+        </a:ln>
+        <a:ln w="19050" cap="flat" cmpd="sng" algn="ctr">
+          <a:solidFill>
+            <a:schemeClr val="phClr"/>
+          </a:solidFill>
+          <a:prstDash val="solid"/>
+          <a:miter lim="800000"/>
+        </a:ln>
+      </a:lnStyleLst>
+      <a:effectStyleLst>
+        <a:effectStyle>
+          <a:effectLst/>
+        </a:effectStyle>
+        <a:effectStyle>
+          <a:effectLst/>
+        </a:effectStyle>
+        <a:effectStyle>
+          <a:effectLst>
+            <a:outerShdw blurRad="57150" dist="19050" dir="5400000" algn="ctr" rotWithShape="0">
+              <a:srgbClr val="000000">
+                <a:alpha val="63000"/>
+              </a:srgbClr>
+            </a:outerShdw>
+          </a:effectLst>
+        </a:effectStyle>
+      </a:effectStyleLst>
+      <a:bgFillStyleLst>
+        <a:solidFill>
+          <a:schemeClr val="phClr"/>
+        </a:solidFill>
+        <a:solidFill>
+          <a:schemeClr val="phClr">
+            <a:tint val="95000"/>
+            <a:satMod val="170000"/>
+          </a:schemeClr>
+        </a:solidFill>
+        <a:gradFill rotWithShape="1">
+          <a:gsLst>
+            <a:gs pos="0">
+              <a:schemeClr val="phClr">
+                <a:tint val="93000"/>
+                <a:satMod val="150000"/>
+                <a:shade val="98000"/>
+                <a:lumMod val="102000"/>
+              </a:schemeClr>
+            </a:gs>
+            <a:gs pos="50000">
+              <a:schemeClr val="phClr">
+                <a:tint val="98000"/>
+                <a:satMod val="130000"/>
+                <a:shade val="90000"/>
+                <a:lumMod val="103000"/>
+              </a:schemeClr>
+            </a:gs>
+            <a:gs pos="100000">
+              <a:schemeClr val="phClr">
+                <a:shade val="63000"/>
+                <a:satMod val="120000"/>
+              </a:schemeClr>
+            </a:gs>
+          </a:gsLst>
+          <a:lin ang="5400000" scaled="0"/>
+        </a:gradFill>
+      </a:bgFillStyleLst>
+    </a:fmtScheme>
+  </a:themeElements>
+  <a:objectDefaults/>
+  <a:extraClrSchemeLst/>
+  <a:extLst>
+    <a:ext uri="{05A4C25C-085E-4340-85A3-A5531E510DB2}">
+      <thm15:themeFamily xmlns:thm15="http://schemas.microsoft.com/office/thememl/2012/main" name="Office Theme" id="{62F939B6-93AF-4DB8-9C6B-D6C7DFDC589F}" vid="{4A3C46E8-61CC-4603-A589-7422A47A8E4A}"/>
+    </a:ext>
+  </a:extLst>
+</a:theme>
 </file>
 
-<file path=customXml/item2.xml><?xml version="1.0" encoding="utf-8"?>
+<file path=customXml/item1.xml><?xml version="1.0" encoding="utf-8"?>
 <p:properties xmlns:p="http://schemas.microsoft.com/office/2006/metadata/properties" xmlns:xsi="http://www.w3.org/2001/XMLSchema-instance" xmlns:pc="http://schemas.microsoft.com/office/infopath/2007/PartnerControls">
   <documentManagement>
     <_dlc_DocId xmlns="b4ebf394-daf6-497a-96c5-a2f8c10b38cf">TT6HZDVJM2HV-178-321</_dlc_DocId>
@@ -21756,15 +22957,13 @@
 </p:properties>
 </file>
 
-<file path=customXml/itemProps1.xml><?xml version="1.0" encoding="utf-8"?>
-<ds:datastoreItem xmlns:ds="http://schemas.openxmlformats.org/officeDocument/2006/customXml" ds:itemID="{BEF5FAEC-2962-49F1-B059-468C913865E2}">
-  <ds:schemaRefs>
-    <ds:schemaRef ds:uri="http://schemas.microsoft.com/VisualStudio/2011/storyboarding/control"/>
-  </ds:schemaRefs>
-</ds:datastoreItem>
+<file path=customXml/item2.xml><?xml version="1.0" encoding="utf-8"?>
+<Control xmlns="http://schemas.microsoft.com/VisualStudio/2011/storyboarding/control">
+  <Id Name="System.Storyboarding.Common.DragSelection" Revision="1" Stencil="System.Storyboarding.Common" StencilVersion="0.1"/>
+</Control>
 </file>
 
-<file path=customXml/itemProps2.xml><?xml version="1.0" encoding="utf-8"?>
+<file path=customXml/itemProps1.xml><?xml version="1.0" encoding="utf-8"?>
 <ds:datastoreItem xmlns:ds="http://schemas.openxmlformats.org/officeDocument/2006/customXml" ds:itemID="{0B37D8FA-A6F1-419E-8C0C-4E8E2E06BD8E}">
   <ds:schemaRefs>
     <ds:schemaRef ds:uri="http://schemas.microsoft.com/office/2006/metadata/properties"/>
@@ -21772,4 +22971,12 @@
     <ds:schemaRef ds:uri="b4ebf394-daf6-497a-96c5-a2f8c10b38cf"/>
   </ds:schemaRefs>
 </ds:datastoreItem>
+</file>
+
+<file path=customXml/itemProps2.xml><?xml version="1.0" encoding="utf-8"?>
+<ds:datastoreItem xmlns:ds="http://schemas.openxmlformats.org/officeDocument/2006/customXml" ds:itemID="{BEF5FAEC-2962-49F1-B059-468C913865E2}">
+  <ds:schemaRefs>
+    <ds:schemaRef ds:uri="http://schemas.microsoft.com/VisualStudio/2011/storyboarding/control"/>
+  </ds:schemaRefs>
+</ds:datastoreItem>
 </file>
</xml_diff>